<commit_message>
updated slides for part 2 of workshop
</commit_message>
<xml_diff>
--- a/connect2016/developer/02/02.pptx
+++ b/connect2016/developer/02/02.pptx
@@ -14,15 +14,15 @@
   <p:sldIdLst>
     <p:sldId id="444" r:id="rId3"/>
     <p:sldId id="445" r:id="rId4"/>
-    <p:sldId id="472" r:id="rId5"/>
-    <p:sldId id="485" r:id="rId6"/>
-    <p:sldId id="486" r:id="rId7"/>
-    <p:sldId id="487" r:id="rId8"/>
-    <p:sldId id="488" r:id="rId9"/>
-    <p:sldId id="489" r:id="rId10"/>
-    <p:sldId id="490" r:id="rId11"/>
-    <p:sldId id="491" r:id="rId12"/>
-    <p:sldId id="492" r:id="rId13"/>
+    <p:sldId id="493" r:id="rId5"/>
+    <p:sldId id="472" r:id="rId6"/>
+    <p:sldId id="487" r:id="rId7"/>
+    <p:sldId id="489" r:id="rId8"/>
+    <p:sldId id="490" r:id="rId9"/>
+    <p:sldId id="491" r:id="rId10"/>
+    <p:sldId id="492" r:id="rId11"/>
+    <p:sldId id="494" r:id="rId12"/>
+    <p:sldId id="495" r:id="rId13"/>
     <p:sldId id="484" r:id="rId14"/>
   </p:sldIdLst>
   <p:sldSz cx="9144000" cy="5143500" type="screen16x9"/>
@@ -129,15 +129,15 @@
           <p14:sldIdLst>
             <p14:sldId id="444"/>
             <p14:sldId id="445"/>
+            <p14:sldId id="493"/>
             <p14:sldId id="472"/>
-            <p14:sldId id="485"/>
-            <p14:sldId id="486"/>
             <p14:sldId id="487"/>
-            <p14:sldId id="488"/>
             <p14:sldId id="489"/>
             <p14:sldId id="490"/>
             <p14:sldId id="491"/>
             <p14:sldId id="492"/>
+            <p14:sldId id="494"/>
+            <p14:sldId id="495"/>
             <p14:sldId id="484"/>
           </p14:sldIdLst>
         </p14:section>
@@ -267,7 +267,7 @@
           <a:p>
             <a:fld id="{B5389E1E-C654-E943-9883-792E99AD7287}" type="datetimeFigureOut">
               <a:rPr lang="en-US" smtClean="0"/>
-              <a:t>8/30/2016</a:t>
+              <a:t>9/20/2016</a:t>
             </a:fld>
             <a:endParaRPr lang="en-US"/>
           </a:p>
@@ -433,7 +433,7 @@
           <a:p>
             <a:fld id="{9920D99B-2862-464A-984E-65BFC5FC0BBC}" type="datetimeFigureOut">
               <a:rPr lang="en-US" smtClean="0"/>
-              <a:t>8/30/2016</a:t>
+              <a:t>9/20/2016</a:t>
             </a:fld>
             <a:endParaRPr lang="en-US"/>
           </a:p>
@@ -778,7 +778,7 @@
           <a:p>
             <a:fld id="{F39351FC-18D6-4741-8EEB-9FDB1F020AAC}" type="slidenum">
               <a:rPr lang="en-US" smtClean="0"/>
-              <a:t>3</a:t>
+              <a:t>4</a:t>
             </a:fld>
             <a:endParaRPr lang="en-US"/>
           </a:p>
@@ -788,198 +788,6 @@
     <p:extLst>
       <p:ext uri="{BB962C8B-B14F-4D97-AF65-F5344CB8AC3E}">
         <p14:creationId xmlns:p14="http://schemas.microsoft.com/office/powerpoint/2010/main" val="2268015358"/>
-      </p:ext>
-    </p:extLst>
-  </p:cSld>
-  <p:clrMapOvr>
-    <a:masterClrMapping/>
-  </p:clrMapOvr>
-</p:notes>
-</file>
-
-<file path=ppt/notesSlides/notesSlide2.xml><?xml version="1.0" encoding="utf-8"?>
-<p:notes xmlns:a="http://schemas.openxmlformats.org/drawingml/2006/main" xmlns:r="http://schemas.openxmlformats.org/officeDocument/2006/relationships" xmlns:p="http://schemas.openxmlformats.org/presentationml/2006/main">
-  <p:cSld>
-    <p:spTree>
-      <p:nvGrpSpPr>
-        <p:cNvPr id="1" name=""/>
-        <p:cNvGrpSpPr/>
-        <p:nvPr/>
-      </p:nvGrpSpPr>
-      <p:grpSpPr>
-        <a:xfrm>
-          <a:off x="0" y="0"/>
-          <a:ext cx="0" cy="0"/>
-          <a:chOff x="0" y="0"/>
-          <a:chExt cx="0" cy="0"/>
-        </a:xfrm>
-      </p:grpSpPr>
-      <p:sp>
-        <p:nvSpPr>
-          <p:cNvPr id="2" name="Slide Image Placeholder 1"/>
-          <p:cNvSpPr>
-            <a:spLocks noGrp="1" noRot="1" noChangeAspect="1"/>
-          </p:cNvSpPr>
-          <p:nvPr>
-            <p:ph type="sldImg"/>
-          </p:nvPr>
-        </p:nvSpPr>
-        <p:spPr/>
-      </p:sp>
-      <p:sp>
-        <p:nvSpPr>
-          <p:cNvPr id="3" name="Notes Placeholder 2"/>
-          <p:cNvSpPr>
-            <a:spLocks noGrp="1"/>
-          </p:cNvSpPr>
-          <p:nvPr>
-            <p:ph type="body" idx="1"/>
-          </p:nvPr>
-        </p:nvSpPr>
-        <p:spPr/>
-        <p:txBody>
-          <a:bodyPr/>
-          <a:lstStyle/>
-          <a:p>
-            <a:pPr marL="0" indent="0">
-              <a:lnSpc>
-                <a:spcPct val="140000"/>
-              </a:lnSpc>
-              <a:buClr>
-                <a:schemeClr val="accent2"/>
-              </a:buClr>
-              <a:buFont typeface="Arial"/>
-              <a:buNone/>
-            </a:pPr>
-            <a:endParaRPr lang="en-US" sz="1200" dirty="0">
-              <a:latin typeface="+mn-lt"/>
-            </a:endParaRPr>
-          </a:p>
-        </p:txBody>
-      </p:sp>
-      <p:sp>
-        <p:nvSpPr>
-          <p:cNvPr id="4" name="Slide Number Placeholder 3"/>
-          <p:cNvSpPr>
-            <a:spLocks noGrp="1"/>
-          </p:cNvSpPr>
-          <p:nvPr>
-            <p:ph type="sldNum" sz="quarter" idx="10"/>
-          </p:nvPr>
-        </p:nvSpPr>
-        <p:spPr/>
-        <p:txBody>
-          <a:bodyPr/>
-          <a:lstStyle/>
-          <a:p>
-            <a:fld id="{F39351FC-18D6-4741-8EEB-9FDB1F020AAC}" type="slidenum">
-              <a:rPr lang="en-US" smtClean="0"/>
-              <a:t>4</a:t>
-            </a:fld>
-            <a:endParaRPr lang="en-US"/>
-          </a:p>
-        </p:txBody>
-      </p:sp>
-    </p:spTree>
-    <p:extLst>
-      <p:ext uri="{BB962C8B-B14F-4D97-AF65-F5344CB8AC3E}">
-        <p14:creationId xmlns:p14="http://schemas.microsoft.com/office/powerpoint/2010/main" val="2648506403"/>
-      </p:ext>
-    </p:extLst>
-  </p:cSld>
-  <p:clrMapOvr>
-    <a:masterClrMapping/>
-  </p:clrMapOvr>
-</p:notes>
-</file>
-
-<file path=ppt/notesSlides/notesSlide3.xml><?xml version="1.0" encoding="utf-8"?>
-<p:notes xmlns:a="http://schemas.openxmlformats.org/drawingml/2006/main" xmlns:r="http://schemas.openxmlformats.org/officeDocument/2006/relationships" xmlns:p="http://schemas.openxmlformats.org/presentationml/2006/main">
-  <p:cSld>
-    <p:spTree>
-      <p:nvGrpSpPr>
-        <p:cNvPr id="1" name=""/>
-        <p:cNvGrpSpPr/>
-        <p:nvPr/>
-      </p:nvGrpSpPr>
-      <p:grpSpPr>
-        <a:xfrm>
-          <a:off x="0" y="0"/>
-          <a:ext cx="0" cy="0"/>
-          <a:chOff x="0" y="0"/>
-          <a:chExt cx="0" cy="0"/>
-        </a:xfrm>
-      </p:grpSpPr>
-      <p:sp>
-        <p:nvSpPr>
-          <p:cNvPr id="2" name="Slide Image Placeholder 1"/>
-          <p:cNvSpPr>
-            <a:spLocks noGrp="1" noRot="1" noChangeAspect="1"/>
-          </p:cNvSpPr>
-          <p:nvPr>
-            <p:ph type="sldImg"/>
-          </p:nvPr>
-        </p:nvSpPr>
-        <p:spPr/>
-      </p:sp>
-      <p:sp>
-        <p:nvSpPr>
-          <p:cNvPr id="3" name="Notes Placeholder 2"/>
-          <p:cNvSpPr>
-            <a:spLocks noGrp="1"/>
-          </p:cNvSpPr>
-          <p:nvPr>
-            <p:ph type="body" idx="1"/>
-          </p:nvPr>
-        </p:nvSpPr>
-        <p:spPr/>
-        <p:txBody>
-          <a:bodyPr/>
-          <a:lstStyle/>
-          <a:p>
-            <a:pPr marL="0" indent="0">
-              <a:lnSpc>
-                <a:spcPct val="140000"/>
-              </a:lnSpc>
-              <a:buClr>
-                <a:schemeClr val="accent2"/>
-              </a:buClr>
-              <a:buFont typeface="Arial"/>
-              <a:buNone/>
-            </a:pPr>
-            <a:endParaRPr lang="en-US" sz="1200" dirty="0">
-              <a:latin typeface="+mn-lt"/>
-            </a:endParaRPr>
-          </a:p>
-        </p:txBody>
-      </p:sp>
-      <p:sp>
-        <p:nvSpPr>
-          <p:cNvPr id="4" name="Slide Number Placeholder 3"/>
-          <p:cNvSpPr>
-            <a:spLocks noGrp="1"/>
-          </p:cNvSpPr>
-          <p:nvPr>
-            <p:ph type="sldNum" sz="quarter" idx="10"/>
-          </p:nvPr>
-        </p:nvSpPr>
-        <p:spPr/>
-        <p:txBody>
-          <a:bodyPr/>
-          <a:lstStyle/>
-          <a:p>
-            <a:fld id="{F39351FC-18D6-4741-8EEB-9FDB1F020AAC}" type="slidenum">
-              <a:rPr lang="en-US" smtClean="0"/>
-              <a:t>5</a:t>
-            </a:fld>
-            <a:endParaRPr lang="en-US"/>
-          </a:p>
-        </p:txBody>
-      </p:sp>
-    </p:spTree>
-    <p:extLst>
-      <p:ext uri="{BB962C8B-B14F-4D97-AF65-F5344CB8AC3E}">
-        <p14:creationId xmlns:p14="http://schemas.microsoft.com/office/powerpoint/2010/main" val="3327613101"/>
       </p:ext>
     </p:extLst>
   </p:cSld>
@@ -6908,7 +6716,7 @@
           <a:p>
             <a:r>
               <a:rPr lang="en-US" dirty="0"/>
-              <a:t>SDK: Node</a:t>
+              <a:t>Exercise 1: N1QL</a:t>
             </a:r>
           </a:p>
         </p:txBody>
@@ -7091,25 +6899,7 @@
             </a:pPr>
             <a:r>
               <a:rPr lang="en-US" dirty="0"/>
-              <a:t>How to install [NPM]</a:t>
-            </a:r>
-          </a:p>
-          <a:p>
-            <a:pPr marL="342900" indent="-342900">
-              <a:buFont typeface="Arial" charset="0"/>
-              <a:buChar char="•"/>
-            </a:pPr>
-            <a:r>
-              <a:rPr lang="en-US" dirty="0"/>
-              <a:t>How to use [</a:t>
-            </a:r>
-            <a:r>
-              <a:rPr lang="en-US" dirty="0" err="1"/>
-              <a:t>todo</a:t>
-            </a:r>
-            <a:r>
-              <a:rPr lang="en-US" dirty="0"/>
-              <a:t>]</a:t>
+              <a:t>Create a primary index on default bucket</a:t>
             </a:r>
           </a:p>
           <a:p>
@@ -7120,6 +6910,91 @@
             <a:endParaRPr lang="en-US" dirty="0"/>
           </a:p>
           <a:p>
+            <a:pPr marL="569913" lvl="1" indent="-342900">
+              <a:buFont typeface="Arial" charset="0"/>
+              <a:buChar char="•"/>
+            </a:pPr>
+            <a:r>
+              <a:rPr lang="en-US" dirty="0"/>
+              <a:t>CREATE PRIMARY INDEX on `default`</a:t>
+            </a:r>
+          </a:p>
+          <a:p>
+            <a:pPr marL="342900" indent="-342900">
+              <a:buFont typeface="Arial" charset="0"/>
+              <a:buChar char="•"/>
+            </a:pPr>
+            <a:endParaRPr lang="en-US" dirty="0"/>
+          </a:p>
+          <a:p>
+            <a:pPr marL="342900" indent="-342900">
+              <a:buFont typeface="Arial" charset="0"/>
+              <a:buChar char="•"/>
+            </a:pPr>
+            <a:r>
+              <a:rPr lang="en-US" dirty="0"/>
+              <a:t>Add document(s) to default bucket</a:t>
+            </a:r>
+          </a:p>
+          <a:p>
+            <a:pPr marL="342900" indent="-342900">
+              <a:buFont typeface="Arial" charset="0"/>
+              <a:buChar char="•"/>
+            </a:pPr>
+            <a:endParaRPr lang="en-US" dirty="0"/>
+          </a:p>
+          <a:p>
+            <a:pPr marL="569913" lvl="1" indent="-342900">
+              <a:buFont typeface="Arial" charset="0"/>
+              <a:buChar char="•"/>
+            </a:pPr>
+            <a:r>
+              <a:rPr lang="en-US" dirty="0"/>
+              <a:t>Use “Create Document” button in Documents view</a:t>
+            </a:r>
+          </a:p>
+          <a:p>
+            <a:pPr marL="342900" indent="-342900">
+              <a:buFont typeface="Arial" charset="0"/>
+              <a:buChar char="•"/>
+            </a:pPr>
+            <a:endParaRPr lang="en-US" dirty="0"/>
+          </a:p>
+          <a:p>
+            <a:pPr marL="342900" indent="-342900">
+              <a:buFont typeface="Arial" charset="0"/>
+              <a:buChar char="•"/>
+            </a:pPr>
+            <a:r>
+              <a:rPr lang="en-US" dirty="0"/>
+              <a:t>SELECT documents</a:t>
+            </a:r>
+          </a:p>
+          <a:p>
+            <a:pPr marL="342900" indent="-342900">
+              <a:buFont typeface="Arial" charset="0"/>
+              <a:buChar char="•"/>
+            </a:pPr>
+            <a:endParaRPr lang="en-US" dirty="0"/>
+          </a:p>
+          <a:p>
+            <a:pPr marL="569913" lvl="1" indent="-342900">
+              <a:buFont typeface="Arial" charset="0"/>
+              <a:buChar char="•"/>
+            </a:pPr>
+            <a:r>
+              <a:rPr lang="en-US" dirty="0"/>
+              <a:t>SELECT d.* FROM `default` d</a:t>
+            </a:r>
+          </a:p>
+          <a:p>
+            <a:pPr marL="342900" indent="-342900">
+              <a:buFont typeface="Arial" charset="0"/>
+              <a:buChar char="•"/>
+            </a:pPr>
+            <a:endParaRPr lang="en-US" dirty="0"/>
+          </a:p>
+          <a:p>
             <a:endParaRPr lang="en-US" dirty="0"/>
           </a:p>
         </p:txBody>
@@ -7127,7 +7002,7 @@
     </p:spTree>
     <p:extLst>
       <p:ext uri="{BB962C8B-B14F-4D97-AF65-F5344CB8AC3E}">
-        <p14:creationId xmlns:p14="http://schemas.microsoft.com/office/powerpoint/2010/main" val="181234665"/>
+        <p14:creationId xmlns:p14="http://schemas.microsoft.com/office/powerpoint/2010/main" val="4131121896"/>
       </p:ext>
     </p:extLst>
   </p:cSld>
@@ -7171,7 +7046,7 @@
           <a:p>
             <a:r>
               <a:rPr lang="en-US" dirty="0"/>
-              <a:t>SDK: Java</a:t>
+              <a:t>Exercise 2: Using SDK in “Hello World”</a:t>
             </a:r>
           </a:p>
         </p:txBody>
@@ -7186,8 +7061,8 @@
         </p:nvSpPr>
         <p:spPr>
           <a:xfrm>
-            <a:off x="609600" y="838200"/>
-            <a:ext cx="8007739" cy="3394472"/>
+            <a:off x="198158" y="838200"/>
+            <a:ext cx="8717242" cy="3394472"/>
           </a:xfrm>
           <a:prstGeom prst="rect">
             <a:avLst/>
@@ -7353,35 +7228,12 @@
               <a:buChar char="•"/>
             </a:pPr>
             <a:r>
-              <a:rPr lang="en-US" dirty="0"/>
-              <a:t>How to install [</a:t>
-            </a:r>
-            <a:r>
-              <a:rPr lang="en-US" dirty="0" err="1"/>
-              <a:t>todo</a:t>
-            </a:r>
-            <a:r>
-              <a:rPr lang="en-US" dirty="0"/>
-              <a:t>]</a:t>
-            </a:r>
-          </a:p>
-          <a:p>
-            <a:pPr marL="342900" indent="-342900">
-              <a:buFont typeface="Arial" charset="0"/>
-              <a:buChar char="•"/>
-            </a:pPr>
-            <a:r>
-              <a:rPr lang="en-US" dirty="0"/>
-              <a:t>How to use [</a:t>
-            </a:r>
-            <a:r>
-              <a:rPr lang="en-US" dirty="0" err="1"/>
-              <a:t>todo</a:t>
-            </a:r>
-            <a:r>
-              <a:rPr lang="en-US" dirty="0"/>
-              <a:t>]</a:t>
-            </a:r>
+              <a:rPr lang="en-US" sz="1800" dirty="0">
+                <a:hlinkClick r:id="rId2"/>
+              </a:rPr>
+              <a:t>https://github.com/couchbaselabs/workshop/tree/master/connect2016/developer/02</a:t>
+            </a:r>
+            <a:endParaRPr lang="en-US" sz="1800" dirty="0"/>
           </a:p>
           <a:p>
             <a:pPr marL="342900" indent="-342900">
@@ -7391,6 +7243,64 @@
             <a:endParaRPr lang="en-US" dirty="0"/>
           </a:p>
           <a:p>
+            <a:pPr marL="342900" indent="-342900">
+              <a:buFont typeface="Arial" charset="0"/>
+              <a:buChar char="•"/>
+            </a:pPr>
+            <a:r>
+              <a:rPr lang="en-US" dirty="0" err="1"/>
+              <a:t>dotnet</a:t>
+            </a:r>
+            <a:endParaRPr lang="en-US" dirty="0"/>
+          </a:p>
+          <a:p>
+            <a:pPr marL="342900" indent="-342900">
+              <a:buFont typeface="Arial" charset="0"/>
+              <a:buChar char="•"/>
+            </a:pPr>
+            <a:r>
+              <a:rPr lang="en-US" dirty="0"/>
+              <a:t>java</a:t>
+            </a:r>
+          </a:p>
+          <a:p>
+            <a:pPr marL="342900" indent="-342900">
+              <a:buFont typeface="Arial" charset="0"/>
+              <a:buChar char="•"/>
+            </a:pPr>
+            <a:r>
+              <a:rPr lang="en-US" dirty="0"/>
+              <a:t>node</a:t>
+            </a:r>
+          </a:p>
+          <a:p>
+            <a:pPr marL="342900" indent="-342900">
+              <a:buFont typeface="Arial" charset="0"/>
+              <a:buChar char="•"/>
+            </a:pPr>
+            <a:endParaRPr lang="en-US" dirty="0"/>
+          </a:p>
+          <a:p>
+            <a:pPr marL="342900" indent="-342900">
+              <a:buFont typeface="Arial" charset="0"/>
+              <a:buChar char="•"/>
+            </a:pPr>
+            <a:r>
+              <a:rPr lang="en-US" dirty="0"/>
+              <a:t>Insert document(s)</a:t>
+            </a:r>
+          </a:p>
+          <a:p>
+            <a:pPr marL="342900" indent="-342900">
+              <a:buFont typeface="Arial" charset="0"/>
+              <a:buChar char="•"/>
+            </a:pPr>
+            <a:r>
+              <a:rPr lang="en-US" dirty="0"/>
+              <a:t>Select documents with N1QL</a:t>
+            </a:r>
+          </a:p>
+          <a:p>
             <a:endParaRPr lang="en-US" dirty="0"/>
           </a:p>
         </p:txBody>
@@ -7398,7 +7308,7 @@
     </p:spTree>
     <p:extLst>
       <p:ext uri="{BB962C8B-B14F-4D97-AF65-F5344CB8AC3E}">
-        <p14:creationId xmlns:p14="http://schemas.microsoft.com/office/powerpoint/2010/main" val="1324995767"/>
+        <p14:creationId xmlns:p14="http://schemas.microsoft.com/office/powerpoint/2010/main" val="3386954043"/>
       </p:ext>
     </p:extLst>
   </p:cSld>
@@ -7525,7 +7435,7 @@
             </a:pPr>
             <a:r>
               <a:rPr lang="en-US" dirty="0"/>
-              <a:t>Using </a:t>
+              <a:t>Using Query Workbench / </a:t>
             </a:r>
             <a:r>
               <a:rPr lang="en-US" dirty="0" err="1"/>
@@ -7643,229 +7553,64 @@
           <a:lstStyle/>
           <a:p>
             <a:r>
-              <a:rPr lang="en-US" dirty="0" err="1"/>
-              <a:t>cbq</a:t>
-            </a:r>
-            <a:endParaRPr lang="en-US" dirty="0"/>
+              <a:rPr lang="en-US" dirty="0"/>
+              <a:t>Query Workbench</a:t>
+            </a:r>
           </a:p>
         </p:txBody>
       </p:sp>
-      <p:sp>
-        <p:nvSpPr>
-          <p:cNvPr id="5" name="Content Placeholder 2"/>
-          <p:cNvSpPr txBox="1">
-            <a:spLocks/>
-          </p:cNvSpPr>
+      <p:pic>
+        <p:nvPicPr>
+          <p:cNvPr id="4" name="Picture 3"/>
+          <p:cNvPicPr>
+            <a:picLocks noChangeAspect="1"/>
+          </p:cNvPicPr>
           <p:nvPr/>
-        </p:nvSpPr>
+        </p:nvPicPr>
+        <p:blipFill>
+          <a:blip r:embed="rId2"/>
+          <a:stretch>
+            <a:fillRect/>
+          </a:stretch>
+        </p:blipFill>
         <p:spPr>
           <a:xfrm>
-            <a:off x="457200" y="685800"/>
-            <a:ext cx="8007739" cy="3394472"/>
+            <a:off x="371475" y="1000409"/>
+            <a:ext cx="8020050" cy="3965053"/>
           </a:xfrm>
           <a:prstGeom prst="rect">
             <a:avLst/>
           </a:prstGeom>
         </p:spPr>
+      </p:pic>
+      <p:sp>
+        <p:nvSpPr>
+          <p:cNvPr id="5" name="TextBox 4"/>
+          <p:cNvSpPr txBox="1"/>
+          <p:nvPr/>
+        </p:nvSpPr>
+        <p:spPr>
+          <a:xfrm>
+            <a:off x="504825" y="584671"/>
+            <a:ext cx="2167581" cy="646331"/>
+          </a:xfrm>
+          <a:prstGeom prst="rect">
+            <a:avLst/>
+          </a:prstGeom>
+          <a:noFill/>
+        </p:spPr>
         <p:txBody>
-          <a:bodyPr/>
-          <a:lstStyle>
-            <a:lvl1pPr marL="228600" indent="-228600" algn="l" defTabSz="457200" rtl="0" eaLnBrk="1" latinLnBrk="0" hangingPunct="1">
-              <a:spcBef>
-                <a:spcPts val="0"/>
-              </a:spcBef>
-              <a:buClr>
-                <a:schemeClr val="accent1"/>
-              </a:buClr>
-              <a:buFont typeface="Wingdings" charset="2"/>
-              <a:buChar char="§"/>
-              <a:defRPr sz="2400" kern="1200">
-                <a:solidFill>
-                  <a:schemeClr val="tx1"/>
-                </a:solidFill>
-                <a:latin typeface="+mn-lt"/>
-                <a:ea typeface="+mn-ea"/>
-                <a:cs typeface="+mn-cs"/>
-              </a:defRPr>
-            </a:lvl1pPr>
-            <a:lvl2pPr marL="455613" indent="-227013" algn="l" defTabSz="457200" rtl="0" eaLnBrk="1" latinLnBrk="0" hangingPunct="1">
-              <a:spcBef>
-                <a:spcPts val="0"/>
-              </a:spcBef>
-              <a:buClr>
-                <a:srgbClr val="262626"/>
-              </a:buClr>
-              <a:buFont typeface="Wingdings" charset="2"/>
-              <a:buChar char="§"/>
-              <a:defRPr sz="2000" kern="1200">
-                <a:solidFill>
-                  <a:schemeClr val="tx1"/>
-                </a:solidFill>
-                <a:latin typeface="+mn-lt"/>
-                <a:ea typeface="+mn-ea"/>
-                <a:cs typeface="+mn-cs"/>
-              </a:defRPr>
-            </a:lvl2pPr>
-            <a:lvl3pPr marL="455613" indent="-228600" algn="l" defTabSz="457200" rtl="0" eaLnBrk="1" latinLnBrk="0" hangingPunct="1">
-              <a:spcBef>
-                <a:spcPts val="0"/>
-              </a:spcBef>
-              <a:buClr>
-                <a:srgbClr val="262626"/>
-              </a:buClr>
-              <a:buFont typeface="Wingdings" charset="2"/>
-              <a:buChar char="§"/>
-              <a:defRPr sz="2000" kern="1200">
-                <a:solidFill>
-                  <a:schemeClr val="tx1"/>
-                </a:solidFill>
-                <a:latin typeface="+mn-lt"/>
-                <a:ea typeface="+mn-ea"/>
-                <a:cs typeface="+mn-cs"/>
-              </a:defRPr>
-            </a:lvl3pPr>
-            <a:lvl4pPr marL="455613" indent="-228600" algn="l" defTabSz="457200" rtl="0" eaLnBrk="1" latinLnBrk="0" hangingPunct="1">
-              <a:spcBef>
-                <a:spcPts val="0"/>
-              </a:spcBef>
-              <a:buClr>
-                <a:srgbClr val="262626"/>
-              </a:buClr>
-              <a:buFont typeface="Wingdings" charset="2"/>
-              <a:buChar char="§"/>
-              <a:defRPr sz="2000" kern="1200">
-                <a:solidFill>
-                  <a:schemeClr val="tx1"/>
-                </a:solidFill>
-                <a:latin typeface="+mn-lt"/>
-                <a:ea typeface="+mn-ea"/>
-                <a:cs typeface="+mn-cs"/>
-              </a:defRPr>
-            </a:lvl4pPr>
-            <a:lvl5pPr marL="455613" indent="-228600" algn="l" defTabSz="457200" rtl="0" eaLnBrk="1" latinLnBrk="0" hangingPunct="1">
-              <a:spcBef>
-                <a:spcPts val="200"/>
-              </a:spcBef>
-              <a:buClr>
-                <a:srgbClr val="262626"/>
-              </a:buClr>
-              <a:buFont typeface="Wingdings" charset="2"/>
-              <a:buChar char="§"/>
-              <a:defRPr sz="2000" kern="1200">
-                <a:solidFill>
-                  <a:schemeClr val="tx1"/>
-                </a:solidFill>
-                <a:latin typeface="+mn-lt"/>
-                <a:ea typeface="+mn-ea"/>
-                <a:cs typeface="+mn-cs"/>
-              </a:defRPr>
-            </a:lvl5pPr>
-            <a:lvl6pPr marL="2514600" indent="-228600" algn="l" defTabSz="457200" rtl="0" eaLnBrk="1" latinLnBrk="0" hangingPunct="1">
-              <a:spcBef>
-                <a:spcPct val="20000"/>
-              </a:spcBef>
-              <a:buFont typeface="Arial"/>
-              <a:buChar char="•"/>
-              <a:defRPr sz="2000" kern="1200">
-                <a:solidFill>
-                  <a:schemeClr val="tx1"/>
-                </a:solidFill>
-                <a:latin typeface="+mn-lt"/>
-                <a:ea typeface="+mn-ea"/>
-                <a:cs typeface="+mn-cs"/>
-              </a:defRPr>
-            </a:lvl6pPr>
-            <a:lvl7pPr marL="2971800" indent="-228600" algn="l" defTabSz="457200" rtl="0" eaLnBrk="1" latinLnBrk="0" hangingPunct="1">
-              <a:spcBef>
-                <a:spcPct val="20000"/>
-              </a:spcBef>
-              <a:buFont typeface="Arial"/>
-              <a:buChar char="•"/>
-              <a:defRPr sz="2000" kern="1200">
-                <a:solidFill>
-                  <a:schemeClr val="tx1"/>
-                </a:solidFill>
-                <a:latin typeface="+mn-lt"/>
-                <a:ea typeface="+mn-ea"/>
-                <a:cs typeface="+mn-cs"/>
-              </a:defRPr>
-            </a:lvl7pPr>
-            <a:lvl8pPr marL="3429000" indent="-228600" algn="l" defTabSz="457200" rtl="0" eaLnBrk="1" latinLnBrk="0" hangingPunct="1">
-              <a:spcBef>
-                <a:spcPct val="20000"/>
-              </a:spcBef>
-              <a:buFont typeface="Arial"/>
-              <a:buChar char="•"/>
-              <a:defRPr sz="2000" kern="1200">
-                <a:solidFill>
-                  <a:schemeClr val="tx1"/>
-                </a:solidFill>
-                <a:latin typeface="+mn-lt"/>
-                <a:ea typeface="+mn-ea"/>
-                <a:cs typeface="+mn-cs"/>
-              </a:defRPr>
-            </a:lvl8pPr>
-            <a:lvl9pPr marL="3886200" indent="-228600" algn="l" defTabSz="457200" rtl="0" eaLnBrk="1" latinLnBrk="0" hangingPunct="1">
-              <a:spcBef>
-                <a:spcPct val="20000"/>
-              </a:spcBef>
-              <a:buFont typeface="Arial"/>
-              <a:buChar char="•"/>
-              <a:defRPr sz="2000" kern="1200">
-                <a:solidFill>
-                  <a:schemeClr val="tx1"/>
-                </a:solidFill>
-                <a:latin typeface="+mn-lt"/>
-                <a:ea typeface="+mn-ea"/>
-                <a:cs typeface="+mn-cs"/>
-              </a:defRPr>
-            </a:lvl9pPr>
-          </a:lstStyle>
-          <a:p>
-            <a:pPr marL="342900" indent="-342900">
-              <a:buFont typeface="Arial" charset="0"/>
-              <a:buChar char="•"/>
-            </a:pPr>
-            <a:r>
-              <a:rPr lang="en-US" dirty="0"/>
-              <a:t>Command Line N1QL tool</a:t>
-            </a:r>
-          </a:p>
-          <a:p>
-            <a:pPr marL="342900" indent="-342900">
-              <a:buFont typeface="Arial" charset="0"/>
-              <a:buChar char="•"/>
-            </a:pPr>
-            <a:r>
-              <a:rPr lang="en-US" dirty="0"/>
-              <a:t>Windows: [path]</a:t>
-            </a:r>
-          </a:p>
-          <a:p>
-            <a:pPr marL="342900" indent="-342900">
-              <a:buFont typeface="Arial" charset="0"/>
-              <a:buChar char="•"/>
-            </a:pPr>
-            <a:r>
-              <a:rPr lang="en-US" dirty="0"/>
-              <a:t>OS X: [path]</a:t>
-            </a:r>
-          </a:p>
-          <a:p>
-            <a:pPr marL="342900" indent="-342900">
-              <a:buFont typeface="Arial" charset="0"/>
-              <a:buChar char="•"/>
-            </a:pPr>
-            <a:r>
-              <a:rPr lang="en-US" dirty="0"/>
-              <a:t>Linux: [path]</a:t>
-            </a:r>
-          </a:p>
-          <a:p>
-            <a:pPr marL="342900" indent="-342900">
-              <a:buFont typeface="Arial" charset="0"/>
-              <a:buChar char="•"/>
-            </a:pPr>
+          <a:bodyPr wrap="none" rtlCol="0">
+            <a:spAutoFit/>
+          </a:bodyPr>
+          <a:lstStyle/>
+          <a:p>
+            <a:r>
+              <a:rPr lang="en-US" dirty="0">
+                <a:hlinkClick r:id="rId3"/>
+              </a:rPr>
+              <a:t>http://localhost:8091</a:t>
+            </a:r>
             <a:endParaRPr lang="en-US" dirty="0"/>
           </a:p>
           <a:p>
@@ -7876,21 +7621,13 @@
     </p:spTree>
     <p:extLst>
       <p:ext uri="{BB962C8B-B14F-4D97-AF65-F5344CB8AC3E}">
-        <p14:creationId xmlns:p14="http://schemas.microsoft.com/office/powerpoint/2010/main" val="4008062327"/>
+        <p14:creationId xmlns:p14="http://schemas.microsoft.com/office/powerpoint/2010/main" val="2365283147"/>
       </p:ext>
     </p:extLst>
   </p:cSld>
   <p:clrMapOvr>
     <a:masterClrMapping/>
   </p:clrMapOvr>
-  <mc:AlternateContent xmlns:mc="http://schemas.openxmlformats.org/markup-compatibility/2006" xmlns:p14="http://schemas.microsoft.com/office/powerpoint/2010/main">
-    <mc:Choice Requires="p14">
-      <p:transition p14:dur="10"/>
-    </mc:Choice>
-    <mc:Fallback xmlns="">
-      <p:transition/>
-    </mc:Fallback>
-  </mc:AlternateContent>
 </p:sld>
 </file>
 
@@ -7930,10 +7667,7 @@
               <a:rPr lang="en-US" dirty="0" err="1"/>
               <a:t>cbq</a:t>
             </a:r>
-            <a:r>
-              <a:rPr lang="en-US" dirty="0"/>
-              <a:t>: SELECT</a:t>
-            </a:r>
+            <a:endParaRPr lang="en-US" dirty="0"/>
           </a:p>
         </p:txBody>
       </p:sp>
@@ -8109,6 +7843,170 @@
             </a:lvl9pPr>
           </a:lstStyle>
           <a:p>
+            <a:pPr marL="342900" indent="-342900">
+              <a:buFont typeface="Arial" charset="0"/>
+              <a:buChar char="•"/>
+            </a:pPr>
+            <a:r>
+              <a:rPr lang="en-US" dirty="0"/>
+              <a:t>Command Line N1QL tool</a:t>
+            </a:r>
+          </a:p>
+          <a:p>
+            <a:pPr marL="342900" indent="-342900">
+              <a:buFont typeface="Arial" charset="0"/>
+              <a:buChar char="•"/>
+            </a:pPr>
+            <a:endParaRPr lang="en-US" dirty="0"/>
+          </a:p>
+          <a:p>
+            <a:pPr marL="342900" indent="-342900">
+              <a:buFont typeface="Arial" charset="0"/>
+              <a:buChar char="•"/>
+            </a:pPr>
+            <a:r>
+              <a:rPr lang="en-US" b="1" dirty="0"/>
+              <a:t>Windows</a:t>
+            </a:r>
+            <a:r>
+              <a:rPr lang="en-US" dirty="0"/>
+              <a:t>: </a:t>
+            </a:r>
+            <a:r>
+              <a:rPr lang="en-US" sz="2000" dirty="0">
+                <a:latin typeface="Consolas" panose="020B0609020204030204" pitchFamily="49" charset="0"/>
+              </a:rPr>
+              <a:t>C:\Program Files\</a:t>
+            </a:r>
+            <a:r>
+              <a:rPr lang="en-US" sz="2000" dirty="0" err="1">
+                <a:latin typeface="Consolas" panose="020B0609020204030204" pitchFamily="49" charset="0"/>
+              </a:rPr>
+              <a:t>Couchbase</a:t>
+            </a:r>
+            <a:r>
+              <a:rPr lang="en-US" sz="2000" dirty="0">
+                <a:latin typeface="Consolas" panose="020B0609020204030204" pitchFamily="49" charset="0"/>
+              </a:rPr>
+              <a:t>\Server\bin</a:t>
+            </a:r>
+          </a:p>
+          <a:p>
+            <a:pPr marL="342900" indent="-342900">
+              <a:buFont typeface="Arial" charset="0"/>
+              <a:buChar char="•"/>
+            </a:pPr>
+            <a:endParaRPr lang="en-US" sz="2000" dirty="0">
+              <a:latin typeface="Consolas" panose="020B0609020204030204" pitchFamily="49" charset="0"/>
+            </a:endParaRPr>
+          </a:p>
+          <a:p>
+            <a:pPr marL="342900" indent="-342900">
+              <a:buFont typeface="Arial" charset="0"/>
+              <a:buChar char="•"/>
+            </a:pPr>
+            <a:r>
+              <a:rPr lang="en-US" b="1" dirty="0"/>
+              <a:t>OS X</a:t>
+            </a:r>
+            <a:r>
+              <a:rPr lang="en-US" dirty="0"/>
+              <a:t>: </a:t>
+            </a:r>
+            <a:r>
+              <a:rPr lang="en-US" sz="2000" dirty="0">
+                <a:latin typeface="Consolas" panose="020B0609020204030204" pitchFamily="49" charset="0"/>
+              </a:rPr>
+              <a:t>/Applications/</a:t>
+            </a:r>
+            <a:r>
+              <a:rPr lang="en-US" sz="2000" dirty="0" err="1">
+                <a:latin typeface="Consolas" panose="020B0609020204030204" pitchFamily="49" charset="0"/>
+              </a:rPr>
+              <a:t>Couchbase</a:t>
+            </a:r>
+            <a:r>
+              <a:rPr lang="en-US" sz="2000" dirty="0">
+                <a:latin typeface="Consolas" panose="020B0609020204030204" pitchFamily="49" charset="0"/>
+              </a:rPr>
+              <a:t> </a:t>
+            </a:r>
+            <a:r>
+              <a:rPr lang="en-US" sz="2000" dirty="0" err="1">
+                <a:latin typeface="Consolas" panose="020B0609020204030204" pitchFamily="49" charset="0"/>
+              </a:rPr>
+              <a:t>Server.app</a:t>
+            </a:r>
+            <a:r>
+              <a:rPr lang="en-US" sz="2000" dirty="0">
+                <a:latin typeface="Consolas" panose="020B0609020204030204" pitchFamily="49" charset="0"/>
+              </a:rPr>
+              <a:t>/Contents/Resources/</a:t>
+            </a:r>
+            <a:r>
+              <a:rPr lang="en-US" sz="2000" dirty="0" err="1">
+                <a:latin typeface="Consolas" panose="020B0609020204030204" pitchFamily="49" charset="0"/>
+              </a:rPr>
+              <a:t>couchbase</a:t>
+            </a:r>
+            <a:r>
+              <a:rPr lang="en-US" sz="2000" dirty="0">
+                <a:latin typeface="Consolas" panose="020B0609020204030204" pitchFamily="49" charset="0"/>
+              </a:rPr>
+              <a:t>-core/bin</a:t>
+            </a:r>
+          </a:p>
+          <a:p>
+            <a:pPr marL="342900" indent="-342900">
+              <a:buFont typeface="Arial" charset="0"/>
+              <a:buChar char="•"/>
+            </a:pPr>
+            <a:endParaRPr lang="en-US" sz="2000" dirty="0">
+              <a:latin typeface="Consolas" panose="020B0609020204030204" pitchFamily="49" charset="0"/>
+            </a:endParaRPr>
+          </a:p>
+          <a:p>
+            <a:pPr marL="342900" indent="-342900">
+              <a:buFont typeface="Arial" charset="0"/>
+              <a:buChar char="•"/>
+            </a:pPr>
+            <a:r>
+              <a:rPr lang="en-US" b="1" dirty="0"/>
+              <a:t>Linux</a:t>
+            </a:r>
+            <a:r>
+              <a:rPr lang="en-US" dirty="0"/>
+              <a:t>: </a:t>
+            </a:r>
+            <a:r>
+              <a:rPr lang="en-US" sz="2000" dirty="0">
+                <a:latin typeface="Consolas" panose="020B0609020204030204" pitchFamily="49" charset="0"/>
+              </a:rPr>
+              <a:t>/opt/</a:t>
+            </a:r>
+            <a:r>
+              <a:rPr lang="en-US" sz="2000" dirty="0" err="1">
+                <a:latin typeface="Consolas" panose="020B0609020204030204" pitchFamily="49" charset="0"/>
+              </a:rPr>
+              <a:t>couchbase</a:t>
+            </a:r>
+            <a:r>
+              <a:rPr lang="en-US" sz="2000" dirty="0">
+                <a:latin typeface="Consolas" panose="020B0609020204030204" pitchFamily="49" charset="0"/>
+              </a:rPr>
+              <a:t>/bin/</a:t>
+            </a:r>
+            <a:r>
+              <a:rPr lang="en-US" sz="2000" dirty="0" err="1">
+                <a:latin typeface="Consolas" panose="020B0609020204030204" pitchFamily="49" charset="0"/>
+              </a:rPr>
+              <a:t>cbq</a:t>
+            </a:r>
+            <a:endParaRPr lang="en-US" sz="2000" dirty="0">
+              <a:latin typeface="Consolas" panose="020B0609020204030204" pitchFamily="49" charset="0"/>
+            </a:endParaRPr>
+          </a:p>
+          <a:p>
             <a:endParaRPr lang="en-US" dirty="0"/>
           </a:p>
         </p:txBody>
@@ -8116,7 +8014,7 @@
     </p:spTree>
     <p:extLst>
       <p:ext uri="{BB962C8B-B14F-4D97-AF65-F5344CB8AC3E}">
-        <p14:creationId xmlns:p14="http://schemas.microsoft.com/office/powerpoint/2010/main" val="2224404237"/>
+        <p14:creationId xmlns:p14="http://schemas.microsoft.com/office/powerpoint/2010/main" val="4008062327"/>
       </p:ext>
     </p:extLst>
   </p:cSld>
@@ -8153,251 +8051,6 @@
       </p:grpSpPr>
       <p:sp>
         <p:nvSpPr>
-          <p:cNvPr id="2" name="Title 1"/>
-          <p:cNvSpPr>
-            <a:spLocks noGrp="1"/>
-          </p:cNvSpPr>
-          <p:nvPr>
-            <p:ph type="title"/>
-          </p:nvPr>
-        </p:nvSpPr>
-        <p:spPr/>
-        <p:txBody>
-          <a:bodyPr/>
-          <a:lstStyle/>
-          <a:p>
-            <a:r>
-              <a:rPr lang="en-US" dirty="0" err="1"/>
-              <a:t>cbq</a:t>
-            </a:r>
-            <a:r>
-              <a:rPr lang="en-US" dirty="0"/>
-              <a:t>: </a:t>
-            </a:r>
-            <a:r>
-              <a:rPr lang="en-US" dirty="0" err="1"/>
-              <a:t>etc</a:t>
-            </a:r>
-            <a:endParaRPr lang="en-US" dirty="0"/>
-          </a:p>
-        </p:txBody>
-      </p:sp>
-      <p:sp>
-        <p:nvSpPr>
-          <p:cNvPr id="5" name="Content Placeholder 2"/>
-          <p:cNvSpPr txBox="1">
-            <a:spLocks/>
-          </p:cNvSpPr>
-          <p:nvPr/>
-        </p:nvSpPr>
-        <p:spPr>
-          <a:xfrm>
-            <a:off x="457200" y="685800"/>
-            <a:ext cx="8007739" cy="3394472"/>
-          </a:xfrm>
-          <a:prstGeom prst="rect">
-            <a:avLst/>
-          </a:prstGeom>
-        </p:spPr>
-        <p:txBody>
-          <a:bodyPr/>
-          <a:lstStyle>
-            <a:lvl1pPr marL="228600" indent="-228600" algn="l" defTabSz="457200" rtl="0" eaLnBrk="1" latinLnBrk="0" hangingPunct="1">
-              <a:spcBef>
-                <a:spcPts val="0"/>
-              </a:spcBef>
-              <a:buClr>
-                <a:schemeClr val="accent1"/>
-              </a:buClr>
-              <a:buFont typeface="Wingdings" charset="2"/>
-              <a:buChar char="§"/>
-              <a:defRPr sz="2400" kern="1200">
-                <a:solidFill>
-                  <a:schemeClr val="tx1"/>
-                </a:solidFill>
-                <a:latin typeface="+mn-lt"/>
-                <a:ea typeface="+mn-ea"/>
-                <a:cs typeface="+mn-cs"/>
-              </a:defRPr>
-            </a:lvl1pPr>
-            <a:lvl2pPr marL="455613" indent="-227013" algn="l" defTabSz="457200" rtl="0" eaLnBrk="1" latinLnBrk="0" hangingPunct="1">
-              <a:spcBef>
-                <a:spcPts val="0"/>
-              </a:spcBef>
-              <a:buClr>
-                <a:srgbClr val="262626"/>
-              </a:buClr>
-              <a:buFont typeface="Wingdings" charset="2"/>
-              <a:buChar char="§"/>
-              <a:defRPr sz="2000" kern="1200">
-                <a:solidFill>
-                  <a:schemeClr val="tx1"/>
-                </a:solidFill>
-                <a:latin typeface="+mn-lt"/>
-                <a:ea typeface="+mn-ea"/>
-                <a:cs typeface="+mn-cs"/>
-              </a:defRPr>
-            </a:lvl2pPr>
-            <a:lvl3pPr marL="455613" indent="-228600" algn="l" defTabSz="457200" rtl="0" eaLnBrk="1" latinLnBrk="0" hangingPunct="1">
-              <a:spcBef>
-                <a:spcPts val="0"/>
-              </a:spcBef>
-              <a:buClr>
-                <a:srgbClr val="262626"/>
-              </a:buClr>
-              <a:buFont typeface="Wingdings" charset="2"/>
-              <a:buChar char="§"/>
-              <a:defRPr sz="2000" kern="1200">
-                <a:solidFill>
-                  <a:schemeClr val="tx1"/>
-                </a:solidFill>
-                <a:latin typeface="+mn-lt"/>
-                <a:ea typeface="+mn-ea"/>
-                <a:cs typeface="+mn-cs"/>
-              </a:defRPr>
-            </a:lvl3pPr>
-            <a:lvl4pPr marL="455613" indent="-228600" algn="l" defTabSz="457200" rtl="0" eaLnBrk="1" latinLnBrk="0" hangingPunct="1">
-              <a:spcBef>
-                <a:spcPts val="0"/>
-              </a:spcBef>
-              <a:buClr>
-                <a:srgbClr val="262626"/>
-              </a:buClr>
-              <a:buFont typeface="Wingdings" charset="2"/>
-              <a:buChar char="§"/>
-              <a:defRPr sz="2000" kern="1200">
-                <a:solidFill>
-                  <a:schemeClr val="tx1"/>
-                </a:solidFill>
-                <a:latin typeface="+mn-lt"/>
-                <a:ea typeface="+mn-ea"/>
-                <a:cs typeface="+mn-cs"/>
-              </a:defRPr>
-            </a:lvl4pPr>
-            <a:lvl5pPr marL="455613" indent="-228600" algn="l" defTabSz="457200" rtl="0" eaLnBrk="1" latinLnBrk="0" hangingPunct="1">
-              <a:spcBef>
-                <a:spcPts val="200"/>
-              </a:spcBef>
-              <a:buClr>
-                <a:srgbClr val="262626"/>
-              </a:buClr>
-              <a:buFont typeface="Wingdings" charset="2"/>
-              <a:buChar char="§"/>
-              <a:defRPr sz="2000" kern="1200">
-                <a:solidFill>
-                  <a:schemeClr val="tx1"/>
-                </a:solidFill>
-                <a:latin typeface="+mn-lt"/>
-                <a:ea typeface="+mn-ea"/>
-                <a:cs typeface="+mn-cs"/>
-              </a:defRPr>
-            </a:lvl5pPr>
-            <a:lvl6pPr marL="2514600" indent="-228600" algn="l" defTabSz="457200" rtl="0" eaLnBrk="1" latinLnBrk="0" hangingPunct="1">
-              <a:spcBef>
-                <a:spcPct val="20000"/>
-              </a:spcBef>
-              <a:buFont typeface="Arial"/>
-              <a:buChar char="•"/>
-              <a:defRPr sz="2000" kern="1200">
-                <a:solidFill>
-                  <a:schemeClr val="tx1"/>
-                </a:solidFill>
-                <a:latin typeface="+mn-lt"/>
-                <a:ea typeface="+mn-ea"/>
-                <a:cs typeface="+mn-cs"/>
-              </a:defRPr>
-            </a:lvl6pPr>
-            <a:lvl7pPr marL="2971800" indent="-228600" algn="l" defTabSz="457200" rtl="0" eaLnBrk="1" latinLnBrk="0" hangingPunct="1">
-              <a:spcBef>
-                <a:spcPct val="20000"/>
-              </a:spcBef>
-              <a:buFont typeface="Arial"/>
-              <a:buChar char="•"/>
-              <a:defRPr sz="2000" kern="1200">
-                <a:solidFill>
-                  <a:schemeClr val="tx1"/>
-                </a:solidFill>
-                <a:latin typeface="+mn-lt"/>
-                <a:ea typeface="+mn-ea"/>
-                <a:cs typeface="+mn-cs"/>
-              </a:defRPr>
-            </a:lvl7pPr>
-            <a:lvl8pPr marL="3429000" indent="-228600" algn="l" defTabSz="457200" rtl="0" eaLnBrk="1" latinLnBrk="0" hangingPunct="1">
-              <a:spcBef>
-                <a:spcPct val="20000"/>
-              </a:spcBef>
-              <a:buFont typeface="Arial"/>
-              <a:buChar char="•"/>
-              <a:defRPr sz="2000" kern="1200">
-                <a:solidFill>
-                  <a:schemeClr val="tx1"/>
-                </a:solidFill>
-                <a:latin typeface="+mn-lt"/>
-                <a:ea typeface="+mn-ea"/>
-                <a:cs typeface="+mn-cs"/>
-              </a:defRPr>
-            </a:lvl8pPr>
-            <a:lvl9pPr marL="3886200" indent="-228600" algn="l" defTabSz="457200" rtl="0" eaLnBrk="1" latinLnBrk="0" hangingPunct="1">
-              <a:spcBef>
-                <a:spcPct val="20000"/>
-              </a:spcBef>
-              <a:buFont typeface="Arial"/>
-              <a:buChar char="•"/>
-              <a:defRPr sz="2000" kern="1200">
-                <a:solidFill>
-                  <a:schemeClr val="tx1"/>
-                </a:solidFill>
-                <a:latin typeface="+mn-lt"/>
-                <a:ea typeface="+mn-ea"/>
-                <a:cs typeface="+mn-cs"/>
-              </a:defRPr>
-            </a:lvl9pPr>
-          </a:lstStyle>
-          <a:p>
-            <a:endParaRPr lang="en-US" dirty="0"/>
-          </a:p>
-        </p:txBody>
-      </p:sp>
-    </p:spTree>
-    <p:extLst>
-      <p:ext uri="{BB962C8B-B14F-4D97-AF65-F5344CB8AC3E}">
-        <p14:creationId xmlns:p14="http://schemas.microsoft.com/office/powerpoint/2010/main" val="4001206618"/>
-      </p:ext>
-    </p:extLst>
-  </p:cSld>
-  <p:clrMapOvr>
-    <a:masterClrMapping/>
-  </p:clrMapOvr>
-  <mc:AlternateContent xmlns:mc="http://schemas.openxmlformats.org/markup-compatibility/2006" xmlns:p14="http://schemas.microsoft.com/office/powerpoint/2010/main">
-    <mc:Choice Requires="p14">
-      <p:transition p14:dur="10"/>
-    </mc:Choice>
-    <mc:Fallback xmlns="">
-      <p:transition/>
-    </mc:Fallback>
-  </mc:AlternateContent>
-</p:sld>
-</file>
-
-<file path=ppt/slides/slide6.xml><?xml version="1.0" encoding="utf-8"?>
-<p:sld xmlns:a="http://schemas.openxmlformats.org/drawingml/2006/main" xmlns:r="http://schemas.openxmlformats.org/officeDocument/2006/relationships" xmlns:p="http://schemas.openxmlformats.org/presentationml/2006/main">
-  <p:cSld>
-    <p:spTree>
-      <p:nvGrpSpPr>
-        <p:cNvPr id="1" name=""/>
-        <p:cNvGrpSpPr/>
-        <p:nvPr/>
-      </p:nvGrpSpPr>
-      <p:grpSpPr>
-        <a:xfrm>
-          <a:off x="0" y="0"/>
-          <a:ext cx="0" cy="0"/>
-          <a:chOff x="0" y="0"/>
-          <a:chExt cx="0" cy="0"/>
-        </a:xfrm>
-      </p:grpSpPr>
-      <p:sp>
-        <p:nvSpPr>
           <p:cNvPr id="3" name="Title 2"/>
           <p:cNvSpPr>
             <a:spLocks noGrp="1"/>
@@ -8622,6 +8275,351 @@
     <p:extLst>
       <p:ext uri="{BB962C8B-B14F-4D97-AF65-F5344CB8AC3E}">
         <p14:creationId xmlns:p14="http://schemas.microsoft.com/office/powerpoint/2010/main" val="2407907180"/>
+      </p:ext>
+    </p:extLst>
+  </p:cSld>
+  <p:clrMapOvr>
+    <a:masterClrMapping/>
+  </p:clrMapOvr>
+</p:sld>
+</file>
+
+<file path=ppt/slides/slide6.xml><?xml version="1.0" encoding="utf-8"?>
+<p:sld xmlns:a="http://schemas.openxmlformats.org/drawingml/2006/main" xmlns:r="http://schemas.openxmlformats.org/officeDocument/2006/relationships" xmlns:p="http://schemas.openxmlformats.org/presentationml/2006/main">
+  <p:cSld>
+    <p:spTree>
+      <p:nvGrpSpPr>
+        <p:cNvPr id="1" name=""/>
+        <p:cNvGrpSpPr/>
+        <p:nvPr/>
+      </p:nvGrpSpPr>
+      <p:grpSpPr>
+        <a:xfrm>
+          <a:off x="0" y="0"/>
+          <a:ext cx="0" cy="0"/>
+          <a:chOff x="0" y="0"/>
+          <a:chExt cx="0" cy="0"/>
+        </a:xfrm>
+      </p:grpSpPr>
+      <p:sp>
+        <p:nvSpPr>
+          <p:cNvPr id="2" name="Title 1"/>
+          <p:cNvSpPr>
+            <a:spLocks noGrp="1"/>
+          </p:cNvSpPr>
+          <p:nvPr>
+            <p:ph type="title"/>
+          </p:nvPr>
+        </p:nvSpPr>
+        <p:spPr/>
+        <p:txBody>
+          <a:bodyPr/>
+          <a:lstStyle/>
+          <a:p>
+            <a:r>
+              <a:rPr lang="en-US" dirty="0"/>
+              <a:t>REST API</a:t>
+            </a:r>
+          </a:p>
+        </p:txBody>
+      </p:sp>
+      <p:sp>
+        <p:nvSpPr>
+          <p:cNvPr id="3" name="Content Placeholder 2"/>
+          <p:cNvSpPr txBox="1">
+            <a:spLocks/>
+          </p:cNvSpPr>
+          <p:nvPr/>
+        </p:nvSpPr>
+        <p:spPr>
+          <a:xfrm>
+            <a:off x="609600" y="838200"/>
+            <a:ext cx="8007739" cy="3394472"/>
+          </a:xfrm>
+          <a:prstGeom prst="rect">
+            <a:avLst/>
+          </a:prstGeom>
+        </p:spPr>
+        <p:txBody>
+          <a:bodyPr/>
+          <a:lstStyle>
+            <a:lvl1pPr marL="228600" indent="-228600" algn="l" defTabSz="457200" rtl="0" eaLnBrk="1" latinLnBrk="0" hangingPunct="1">
+              <a:spcBef>
+                <a:spcPts val="0"/>
+              </a:spcBef>
+              <a:buClr>
+                <a:schemeClr val="accent1"/>
+              </a:buClr>
+              <a:buFont typeface="Wingdings" charset="2"/>
+              <a:buChar char="§"/>
+              <a:defRPr sz="2400" kern="1200">
+                <a:solidFill>
+                  <a:schemeClr val="tx1"/>
+                </a:solidFill>
+                <a:latin typeface="+mn-lt"/>
+                <a:ea typeface="+mn-ea"/>
+                <a:cs typeface="+mn-cs"/>
+              </a:defRPr>
+            </a:lvl1pPr>
+            <a:lvl2pPr marL="455613" indent="-227013" algn="l" defTabSz="457200" rtl="0" eaLnBrk="1" latinLnBrk="0" hangingPunct="1">
+              <a:spcBef>
+                <a:spcPts val="0"/>
+              </a:spcBef>
+              <a:buClr>
+                <a:srgbClr val="262626"/>
+              </a:buClr>
+              <a:buFont typeface="Wingdings" charset="2"/>
+              <a:buChar char="§"/>
+              <a:defRPr sz="2000" kern="1200">
+                <a:solidFill>
+                  <a:schemeClr val="tx1"/>
+                </a:solidFill>
+                <a:latin typeface="+mn-lt"/>
+                <a:ea typeface="+mn-ea"/>
+                <a:cs typeface="+mn-cs"/>
+              </a:defRPr>
+            </a:lvl2pPr>
+            <a:lvl3pPr marL="455613" indent="-228600" algn="l" defTabSz="457200" rtl="0" eaLnBrk="1" latinLnBrk="0" hangingPunct="1">
+              <a:spcBef>
+                <a:spcPts val="0"/>
+              </a:spcBef>
+              <a:buClr>
+                <a:srgbClr val="262626"/>
+              </a:buClr>
+              <a:buFont typeface="Wingdings" charset="2"/>
+              <a:buChar char="§"/>
+              <a:defRPr sz="2000" kern="1200">
+                <a:solidFill>
+                  <a:schemeClr val="tx1"/>
+                </a:solidFill>
+                <a:latin typeface="+mn-lt"/>
+                <a:ea typeface="+mn-ea"/>
+                <a:cs typeface="+mn-cs"/>
+              </a:defRPr>
+            </a:lvl3pPr>
+            <a:lvl4pPr marL="455613" indent="-228600" algn="l" defTabSz="457200" rtl="0" eaLnBrk="1" latinLnBrk="0" hangingPunct="1">
+              <a:spcBef>
+                <a:spcPts val="0"/>
+              </a:spcBef>
+              <a:buClr>
+                <a:srgbClr val="262626"/>
+              </a:buClr>
+              <a:buFont typeface="Wingdings" charset="2"/>
+              <a:buChar char="§"/>
+              <a:defRPr sz="2000" kern="1200">
+                <a:solidFill>
+                  <a:schemeClr val="tx1"/>
+                </a:solidFill>
+                <a:latin typeface="+mn-lt"/>
+                <a:ea typeface="+mn-ea"/>
+                <a:cs typeface="+mn-cs"/>
+              </a:defRPr>
+            </a:lvl4pPr>
+            <a:lvl5pPr marL="455613" indent="-228600" algn="l" defTabSz="457200" rtl="0" eaLnBrk="1" latinLnBrk="0" hangingPunct="1">
+              <a:spcBef>
+                <a:spcPts val="200"/>
+              </a:spcBef>
+              <a:buClr>
+                <a:srgbClr val="262626"/>
+              </a:buClr>
+              <a:buFont typeface="Wingdings" charset="2"/>
+              <a:buChar char="§"/>
+              <a:defRPr sz="2000" kern="1200">
+                <a:solidFill>
+                  <a:schemeClr val="tx1"/>
+                </a:solidFill>
+                <a:latin typeface="+mn-lt"/>
+                <a:ea typeface="+mn-ea"/>
+                <a:cs typeface="+mn-cs"/>
+              </a:defRPr>
+            </a:lvl5pPr>
+            <a:lvl6pPr marL="2514600" indent="-228600" algn="l" defTabSz="457200" rtl="0" eaLnBrk="1" latinLnBrk="0" hangingPunct="1">
+              <a:spcBef>
+                <a:spcPct val="20000"/>
+              </a:spcBef>
+              <a:buFont typeface="Arial"/>
+              <a:buChar char="•"/>
+              <a:defRPr sz="2000" kern="1200">
+                <a:solidFill>
+                  <a:schemeClr val="tx1"/>
+                </a:solidFill>
+                <a:latin typeface="+mn-lt"/>
+                <a:ea typeface="+mn-ea"/>
+                <a:cs typeface="+mn-cs"/>
+              </a:defRPr>
+            </a:lvl6pPr>
+            <a:lvl7pPr marL="2971800" indent="-228600" algn="l" defTabSz="457200" rtl="0" eaLnBrk="1" latinLnBrk="0" hangingPunct="1">
+              <a:spcBef>
+                <a:spcPct val="20000"/>
+              </a:spcBef>
+              <a:buFont typeface="Arial"/>
+              <a:buChar char="•"/>
+              <a:defRPr sz="2000" kern="1200">
+                <a:solidFill>
+                  <a:schemeClr val="tx1"/>
+                </a:solidFill>
+                <a:latin typeface="+mn-lt"/>
+                <a:ea typeface="+mn-ea"/>
+                <a:cs typeface="+mn-cs"/>
+              </a:defRPr>
+            </a:lvl7pPr>
+            <a:lvl8pPr marL="3429000" indent="-228600" algn="l" defTabSz="457200" rtl="0" eaLnBrk="1" latinLnBrk="0" hangingPunct="1">
+              <a:spcBef>
+                <a:spcPct val="20000"/>
+              </a:spcBef>
+              <a:buFont typeface="Arial"/>
+              <a:buChar char="•"/>
+              <a:defRPr sz="2000" kern="1200">
+                <a:solidFill>
+                  <a:schemeClr val="tx1"/>
+                </a:solidFill>
+                <a:latin typeface="+mn-lt"/>
+                <a:ea typeface="+mn-ea"/>
+                <a:cs typeface="+mn-cs"/>
+              </a:defRPr>
+            </a:lvl8pPr>
+            <a:lvl9pPr marL="3886200" indent="-228600" algn="l" defTabSz="457200" rtl="0" eaLnBrk="1" latinLnBrk="0" hangingPunct="1">
+              <a:spcBef>
+                <a:spcPct val="20000"/>
+              </a:spcBef>
+              <a:buFont typeface="Arial"/>
+              <a:buChar char="•"/>
+              <a:defRPr sz="2000" kern="1200">
+                <a:solidFill>
+                  <a:schemeClr val="tx1"/>
+                </a:solidFill>
+                <a:latin typeface="+mn-lt"/>
+                <a:ea typeface="+mn-ea"/>
+                <a:cs typeface="+mn-cs"/>
+              </a:defRPr>
+            </a:lvl9pPr>
+          </a:lstStyle>
+          <a:p>
+            <a:pPr marL="342900" indent="-342900">
+              <a:buFont typeface="Arial" charset="0"/>
+              <a:buChar char="•"/>
+            </a:pPr>
+            <a:r>
+              <a:rPr lang="en-US" dirty="0"/>
+              <a:t>Cluster</a:t>
+            </a:r>
+          </a:p>
+          <a:p>
+            <a:pPr marL="342900" indent="-342900">
+              <a:buFont typeface="Arial" charset="0"/>
+              <a:buChar char="•"/>
+            </a:pPr>
+            <a:r>
+              <a:rPr lang="en-US" dirty="0"/>
+              <a:t>Nodes</a:t>
+            </a:r>
+          </a:p>
+          <a:p>
+            <a:pPr marL="342900" indent="-342900">
+              <a:buFont typeface="Arial" charset="0"/>
+              <a:buChar char="•"/>
+            </a:pPr>
+            <a:r>
+              <a:rPr lang="en-US" dirty="0"/>
+              <a:t>Server Group</a:t>
+            </a:r>
+          </a:p>
+          <a:p>
+            <a:pPr marL="342900" indent="-342900">
+              <a:buFont typeface="Arial" charset="0"/>
+              <a:buChar char="•"/>
+            </a:pPr>
+            <a:r>
+              <a:rPr lang="en-US" dirty="0"/>
+              <a:t>Buckets</a:t>
+            </a:r>
+          </a:p>
+          <a:p>
+            <a:pPr marL="342900" indent="-342900">
+              <a:buFont typeface="Arial" charset="0"/>
+              <a:buChar char="•"/>
+            </a:pPr>
+            <a:r>
+              <a:rPr lang="en-US" dirty="0"/>
+              <a:t>Indexes</a:t>
+            </a:r>
+          </a:p>
+          <a:p>
+            <a:pPr marL="342900" indent="-342900">
+              <a:buFont typeface="Arial" charset="0"/>
+              <a:buChar char="•"/>
+            </a:pPr>
+            <a:r>
+              <a:rPr lang="en-US" dirty="0"/>
+              <a:t>Views</a:t>
+            </a:r>
+          </a:p>
+          <a:p>
+            <a:pPr marL="342900" indent="-342900">
+              <a:buFont typeface="Arial" charset="0"/>
+              <a:buChar char="•"/>
+            </a:pPr>
+            <a:r>
+              <a:rPr lang="en-US" dirty="0"/>
+              <a:t>XDCR</a:t>
+            </a:r>
+          </a:p>
+          <a:p>
+            <a:pPr marL="342900" indent="-342900">
+              <a:buFont typeface="Arial" charset="0"/>
+              <a:buChar char="•"/>
+            </a:pPr>
+            <a:r>
+              <a:rPr lang="en-US" dirty="0"/>
+              <a:t>Compaction</a:t>
+            </a:r>
+          </a:p>
+          <a:p>
+            <a:pPr marL="342900" indent="-342900">
+              <a:buFont typeface="Arial" charset="0"/>
+              <a:buChar char="•"/>
+            </a:pPr>
+            <a:r>
+              <a:rPr lang="en-US" dirty="0"/>
+              <a:t>Log</a:t>
+            </a:r>
+          </a:p>
+          <a:p>
+            <a:pPr marL="342900" indent="-342900">
+              <a:buFont typeface="Arial" charset="0"/>
+              <a:buChar char="•"/>
+            </a:pPr>
+            <a:r>
+              <a:rPr lang="en-US" dirty="0"/>
+              <a:t>User/Security</a:t>
+            </a:r>
+          </a:p>
+          <a:p>
+            <a:pPr marL="342900" indent="-342900">
+              <a:buFont typeface="Arial" charset="0"/>
+              <a:buChar char="•"/>
+            </a:pPr>
+            <a:r>
+              <a:rPr lang="en-US" dirty="0"/>
+              <a:t>N1QL</a:t>
+            </a:r>
+          </a:p>
+          <a:p>
+            <a:pPr marL="342900" indent="-342900">
+              <a:buFont typeface="Arial" charset="0"/>
+              <a:buChar char="•"/>
+            </a:pPr>
+            <a:endParaRPr lang="en-US" dirty="0"/>
+          </a:p>
+          <a:p>
+            <a:endParaRPr lang="en-US" dirty="0"/>
+          </a:p>
+        </p:txBody>
+      </p:sp>
+    </p:spTree>
+    <p:extLst>
+      <p:ext uri="{BB962C8B-B14F-4D97-AF65-F5344CB8AC3E}">
+        <p14:creationId xmlns:p14="http://schemas.microsoft.com/office/powerpoint/2010/main" val="3571174370"/>
       </p:ext>
     </p:extLst>
   </p:cSld>
@@ -8665,7 +8663,7 @@
           <a:p>
             <a:r>
               <a:rPr lang="en-US" dirty="0"/>
-              <a:t>REST API: Requests and Responses</a:t>
+              <a:t>SDK: .NET</a:t>
             </a:r>
           </a:p>
         </p:txBody>
@@ -8680,8 +8678,8 @@
         </p:nvSpPr>
         <p:spPr>
           <a:xfrm>
-            <a:off x="457200" y="685800"/>
-            <a:ext cx="8007739" cy="3394472"/>
+            <a:off x="609600" y="838200"/>
+            <a:ext cx="8007739" cy="1924050"/>
           </a:xfrm>
           <a:prstGeom prst="rect">
             <a:avLst/>
@@ -8846,16 +8844,104 @@
               <a:buFont typeface="Arial" charset="0"/>
               <a:buChar char="•"/>
             </a:pPr>
-            <a:endParaRPr lang="en-US" dirty="0"/>
-          </a:p>
-          <a:p>
-            <a:endParaRPr lang="en-US" dirty="0"/>
+            <a:r>
+              <a:rPr lang="en-US" sz="2000" dirty="0"/>
+              <a:t>How to install </a:t>
+            </a:r>
+          </a:p>
+          <a:p>
+            <a:pPr marL="569913" lvl="1" indent="-342900">
+              <a:buFont typeface="Arial" charset="0"/>
+              <a:buChar char="•"/>
+            </a:pPr>
+            <a:endParaRPr lang="en-US" sz="1800" dirty="0"/>
+          </a:p>
+          <a:p>
+            <a:pPr marL="569913" lvl="1" indent="-342900">
+              <a:buFont typeface="Arial" charset="0"/>
+              <a:buChar char="•"/>
+            </a:pPr>
+            <a:r>
+              <a:rPr lang="en-US" sz="1800" dirty="0" err="1"/>
+              <a:t>NuGet</a:t>
+            </a:r>
+            <a:r>
+              <a:rPr lang="en-US" sz="1800" dirty="0"/>
+              <a:t>: Install-Package </a:t>
+            </a:r>
+            <a:r>
+              <a:rPr lang="en-US" sz="1800" dirty="0" err="1"/>
+              <a:t>CouchbaseNetClient</a:t>
+            </a:r>
+            <a:endParaRPr lang="en-US" sz="1800" dirty="0"/>
+          </a:p>
+          <a:p>
+            <a:pPr marL="569913" lvl="1" indent="-342900">
+              <a:buFont typeface="Arial" charset="0"/>
+              <a:buChar char="•"/>
+            </a:pPr>
+            <a:endParaRPr lang="en-US" sz="1800" dirty="0"/>
+          </a:p>
+          <a:p>
+            <a:pPr marL="342900" indent="-342900">
+              <a:buFont typeface="Arial" charset="0"/>
+              <a:buChar char="•"/>
+            </a:pPr>
+            <a:r>
+              <a:rPr lang="en-US" sz="2000" dirty="0"/>
+              <a:t>How to connect to a </a:t>
+            </a:r>
+            <a:r>
+              <a:rPr lang="en-US" sz="2000" dirty="0" err="1"/>
+              <a:t>Couchbase</a:t>
+            </a:r>
+            <a:r>
+              <a:rPr lang="en-US" sz="2000" dirty="0"/>
+              <a:t> cluster</a:t>
+            </a:r>
+          </a:p>
+          <a:p>
+            <a:pPr marL="342900" indent="-342900">
+              <a:buFont typeface="Arial" charset="0"/>
+              <a:buChar char="•"/>
+            </a:pPr>
+            <a:endParaRPr lang="en-US" sz="2000" dirty="0"/>
+          </a:p>
+          <a:p>
+            <a:pPr marL="569913" lvl="1" indent="-342900">
+              <a:buFont typeface="Arial" charset="0"/>
+              <a:buChar char="•"/>
+            </a:pPr>
+            <a:endParaRPr lang="en-US" sz="1800" dirty="0"/>
+          </a:p>
+          <a:p>
+            <a:pPr marL="0" indent="0">
+              <a:buNone/>
+            </a:pPr>
+            <a:endParaRPr lang="en-US" sz="1400" dirty="0"/>
+          </a:p>
+          <a:p>
+            <a:pPr marL="569913" lvl="1" indent="-342900">
+              <a:buFont typeface="Arial" charset="0"/>
+              <a:buChar char="•"/>
+            </a:pPr>
+            <a:endParaRPr lang="en-US" sz="1800" dirty="0"/>
+          </a:p>
+          <a:p>
+            <a:pPr marL="342900" indent="-342900">
+              <a:buFont typeface="Arial" charset="0"/>
+              <a:buChar char="•"/>
+            </a:pPr>
+            <a:endParaRPr lang="en-US" sz="2000" dirty="0"/>
+          </a:p>
+          <a:p>
+            <a:endParaRPr lang="en-US" sz="2000" dirty="0"/>
           </a:p>
         </p:txBody>
       </p:sp>
       <p:sp>
         <p:nvSpPr>
-          <p:cNvPr id="4" name="Content Placeholder 2"/>
+          <p:cNvPr id="5" name="Shape 1658"/>
           <p:cNvSpPr txBox="1">
             <a:spLocks/>
           </p:cNvSpPr>
@@ -8863,15 +8949,17 @@
         </p:nvSpPr>
         <p:spPr>
           <a:xfrm>
-            <a:off x="609600" y="838200"/>
-            <a:ext cx="8007739" cy="3394472"/>
+            <a:off x="1546419" y="2409825"/>
+            <a:ext cx="6134100" cy="2409825"/>
           </a:xfrm>
           <a:prstGeom prst="rect">
             <a:avLst/>
           </a:prstGeom>
         </p:spPr>
         <p:txBody>
-          <a:bodyPr/>
+          <a:bodyPr lIns="0" tIns="0" rIns="0" bIns="0">
+            <a:noAutofit/>
+          </a:bodyPr>
           <a:lstStyle>
             <a:lvl1pPr marL="228600" indent="-228600" algn="l" defTabSz="457200" rtl="0" eaLnBrk="1" latinLnBrk="0" hangingPunct="1">
               <a:spcBef>
@@ -9025,57 +9113,624 @@
             </a:lvl9pPr>
           </a:lstStyle>
           <a:p>
-            <a:pPr marL="342900" indent="-342900">
-              <a:buFont typeface="Arial" charset="0"/>
-              <a:buChar char="•"/>
+            <a:pPr marL="0" indent="0">
+              <a:buNone/>
+              <a:defRPr sz="1800">
+                <a:solidFill>
+                  <a:srgbClr val="000000"/>
+                </a:solidFill>
+              </a:defRPr>
             </a:pPr>
             <a:r>
-              <a:rPr lang="en-US" dirty="0"/>
-              <a:t>HTTP headers: [</a:t>
-            </a:r>
-            <a:r>
-              <a:rPr lang="en-US" dirty="0" err="1"/>
-              <a:t>todo</a:t>
-            </a:r>
-            <a:r>
-              <a:rPr lang="en-US" dirty="0"/>
-              <a:t>]</a:t>
-            </a:r>
-          </a:p>
-          <a:p>
-            <a:pPr marL="342900" indent="-342900">
-              <a:buFont typeface="Arial" charset="0"/>
-              <a:buChar char="•"/>
+              <a:rPr lang="en-US" sz="1100" dirty="0">
+                <a:solidFill>
+                  <a:srgbClr val="1BB2E2"/>
+                </a:solidFill>
+                <a:latin typeface="Courier" charset="0"/>
+                <a:ea typeface="Courier" charset="0"/>
+                <a:cs typeface="Courier" charset="0"/>
+                <a:sym typeface="Consolas"/>
+              </a:rPr>
+              <a:t>//connecting to a </a:t>
+            </a:r>
+            <a:r>
+              <a:rPr lang="en-US" sz="1100" dirty="0" err="1">
+                <a:solidFill>
+                  <a:srgbClr val="1BB2E2"/>
+                </a:solidFill>
+                <a:latin typeface="Courier" charset="0"/>
+                <a:ea typeface="Courier" charset="0"/>
+                <a:cs typeface="Courier" charset="0"/>
+                <a:sym typeface="Consolas"/>
+              </a:rPr>
+              <a:t>Couchbase</a:t>
+            </a:r>
+            <a:r>
+              <a:rPr lang="en-US" sz="1100" dirty="0">
+                <a:solidFill>
+                  <a:srgbClr val="1BB2E2"/>
+                </a:solidFill>
+                <a:latin typeface="Courier" charset="0"/>
+                <a:ea typeface="Courier" charset="0"/>
+                <a:cs typeface="Courier" charset="0"/>
+                <a:sym typeface="Consolas"/>
+              </a:rPr>
+              <a:t> cluster</a:t>
+            </a:r>
+          </a:p>
+          <a:p>
+            <a:pPr marL="0" indent="0">
+              <a:buNone/>
+              <a:defRPr sz="1800">
+                <a:solidFill>
+                  <a:srgbClr val="000000"/>
+                </a:solidFill>
+              </a:defRPr>
             </a:pPr>
             <a:r>
-              <a:rPr lang="en-US" dirty="0"/>
-              <a:t>HTTP response codes: [</a:t>
-            </a:r>
-            <a:r>
-              <a:rPr lang="en-US" dirty="0" err="1"/>
-              <a:t>todo</a:t>
-            </a:r>
-            <a:r>
-              <a:rPr lang="en-US" dirty="0"/>
-              <a:t>]</a:t>
-            </a:r>
-          </a:p>
-          <a:p>
-            <a:pPr marL="342900" indent="-342900">
-              <a:buFont typeface="Arial" charset="0"/>
-              <a:buChar char="•"/>
+              <a:rPr lang="en-US" sz="1100" dirty="0" err="1">
+                <a:solidFill>
+                  <a:srgbClr val="1E1C1C"/>
+                </a:solidFill>
+                <a:latin typeface="Courier" charset="0"/>
+                <a:ea typeface="Courier" charset="0"/>
+                <a:cs typeface="Courier" charset="0"/>
+                <a:sym typeface="Consolas"/>
+              </a:rPr>
+              <a:t>var</a:t>
+            </a:r>
+            <a:r>
+              <a:rPr lang="en-US" sz="1100" dirty="0">
+                <a:solidFill>
+                  <a:srgbClr val="1E1C1C"/>
+                </a:solidFill>
+                <a:latin typeface="Courier" charset="0"/>
+                <a:ea typeface="Courier" charset="0"/>
+                <a:cs typeface="Courier" charset="0"/>
+                <a:sym typeface="Consolas"/>
+              </a:rPr>
+              <a:t> </a:t>
+            </a:r>
+            <a:r>
+              <a:rPr lang="en-US" sz="1100" dirty="0" err="1">
+                <a:solidFill>
+                  <a:srgbClr val="1E1C1C"/>
+                </a:solidFill>
+                <a:latin typeface="Courier" charset="0"/>
+                <a:ea typeface="Courier" charset="0"/>
+                <a:cs typeface="Courier" charset="0"/>
+                <a:sym typeface="Consolas"/>
+              </a:rPr>
+              <a:t>config</a:t>
+            </a:r>
+            <a:r>
+              <a:rPr lang="en-US" sz="1100" dirty="0">
+                <a:solidFill>
+                  <a:srgbClr val="1E1C1C"/>
+                </a:solidFill>
+                <a:latin typeface="Courier" charset="0"/>
+                <a:ea typeface="Courier" charset="0"/>
+                <a:cs typeface="Courier" charset="0"/>
+                <a:sym typeface="Consolas"/>
+              </a:rPr>
+              <a:t> = new </a:t>
+            </a:r>
+            <a:r>
+              <a:rPr lang="en-US" sz="1100" dirty="0" err="1">
+                <a:solidFill>
+                  <a:srgbClr val="1E1C1C"/>
+                </a:solidFill>
+                <a:latin typeface="Courier" charset="0"/>
+                <a:ea typeface="Courier" charset="0"/>
+                <a:cs typeface="Courier" charset="0"/>
+                <a:sym typeface="Consolas"/>
+              </a:rPr>
+              <a:t>ClientConfiguration</a:t>
+            </a:r>
+            <a:r>
+              <a:rPr lang="en-US" sz="1100" dirty="0">
+                <a:solidFill>
+                  <a:srgbClr val="1E1C1C"/>
+                </a:solidFill>
+                <a:latin typeface="Courier" charset="0"/>
+                <a:ea typeface="Courier" charset="0"/>
+                <a:cs typeface="Courier" charset="0"/>
+                <a:sym typeface="Consolas"/>
+              </a:rPr>
+              <a:t>();</a:t>
+            </a:r>
+          </a:p>
+          <a:p>
+            <a:pPr marL="0" indent="0">
+              <a:buNone/>
+              <a:defRPr sz="1800">
+                <a:solidFill>
+                  <a:srgbClr val="000000"/>
+                </a:solidFill>
+              </a:defRPr>
             </a:pPr>
-            <a:endParaRPr lang="en-US" dirty="0"/>
-          </a:p>
-          <a:p>
-            <a:endParaRPr lang="en-US" dirty="0"/>
+            <a:r>
+              <a:rPr lang="en-US" sz="1100" dirty="0" err="1">
+                <a:solidFill>
+                  <a:srgbClr val="1E1C1C"/>
+                </a:solidFill>
+                <a:latin typeface="Courier" charset="0"/>
+                <a:ea typeface="Courier" charset="0"/>
+                <a:cs typeface="Courier" charset="0"/>
+                <a:sym typeface="Consolas"/>
+              </a:rPr>
+              <a:t>config.Services</a:t>
+            </a:r>
+            <a:r>
+              <a:rPr lang="en-US" sz="1100" dirty="0">
+                <a:solidFill>
+                  <a:srgbClr val="1E1C1C"/>
+                </a:solidFill>
+                <a:latin typeface="Courier" charset="0"/>
+                <a:ea typeface="Courier" charset="0"/>
+                <a:cs typeface="Courier" charset="0"/>
+                <a:sym typeface="Consolas"/>
+              </a:rPr>
+              <a:t> = new List&lt;Uri&gt; { “</a:t>
+            </a:r>
+            <a:r>
+              <a:rPr lang="en-US" sz="1100" dirty="0" err="1">
+                <a:solidFill>
+                  <a:srgbClr val="1E1C1C"/>
+                </a:solidFill>
+                <a:latin typeface="Courier" charset="0"/>
+                <a:ea typeface="Courier" charset="0"/>
+                <a:cs typeface="Courier" charset="0"/>
+                <a:sym typeface="Consolas"/>
+              </a:rPr>
+              <a:t>couchbase</a:t>
+            </a:r>
+            <a:r>
+              <a:rPr lang="en-US" sz="1100" dirty="0">
+                <a:solidFill>
+                  <a:srgbClr val="1E1C1C"/>
+                </a:solidFill>
+                <a:latin typeface="Courier" charset="0"/>
+                <a:ea typeface="Courier" charset="0"/>
+                <a:cs typeface="Courier" charset="0"/>
+                <a:sym typeface="Consolas"/>
+              </a:rPr>
+              <a:t>://localhost” };</a:t>
+            </a:r>
+          </a:p>
+          <a:p>
+            <a:pPr marL="0" indent="0">
+              <a:buNone/>
+              <a:defRPr sz="1800">
+                <a:solidFill>
+                  <a:srgbClr val="000000"/>
+                </a:solidFill>
+              </a:defRPr>
+            </a:pPr>
+            <a:r>
+              <a:rPr lang="en-US" sz="1100" dirty="0" err="1">
+                <a:solidFill>
+                  <a:srgbClr val="1E1C1C"/>
+                </a:solidFill>
+                <a:latin typeface="Courier" charset="0"/>
+                <a:ea typeface="Courier" charset="0"/>
+                <a:cs typeface="Courier" charset="0"/>
+                <a:sym typeface="Consolas"/>
+              </a:rPr>
+              <a:t>ClusterHelper.Initialize</a:t>
+            </a:r>
+            <a:r>
+              <a:rPr lang="en-US" sz="1100" dirty="0">
+                <a:solidFill>
+                  <a:srgbClr val="1E1C1C"/>
+                </a:solidFill>
+                <a:latin typeface="Courier" charset="0"/>
+                <a:ea typeface="Courier" charset="0"/>
+                <a:cs typeface="Courier" charset="0"/>
+                <a:sym typeface="Consolas"/>
+              </a:rPr>
+              <a:t>(</a:t>
+            </a:r>
+            <a:r>
+              <a:rPr lang="en-US" sz="1100" dirty="0" err="1">
+                <a:solidFill>
+                  <a:srgbClr val="1E1C1C"/>
+                </a:solidFill>
+                <a:latin typeface="Courier" charset="0"/>
+                <a:ea typeface="Courier" charset="0"/>
+                <a:cs typeface="Courier" charset="0"/>
+                <a:sym typeface="Consolas"/>
+              </a:rPr>
+              <a:t>config</a:t>
+            </a:r>
+            <a:r>
+              <a:rPr lang="en-US" sz="1100" dirty="0">
+                <a:solidFill>
+                  <a:srgbClr val="1E1C1C"/>
+                </a:solidFill>
+                <a:latin typeface="Courier" charset="0"/>
+                <a:ea typeface="Courier" charset="0"/>
+                <a:cs typeface="Courier" charset="0"/>
+                <a:sym typeface="Consolas"/>
+              </a:rPr>
+              <a:t>);</a:t>
+            </a:r>
+          </a:p>
+          <a:p>
+            <a:pPr marL="0" indent="0">
+              <a:buNone/>
+              <a:defRPr sz="1800">
+                <a:solidFill>
+                  <a:srgbClr val="000000"/>
+                </a:solidFill>
+              </a:defRPr>
+            </a:pPr>
+            <a:endParaRPr lang="en-US" sz="1100" dirty="0">
+              <a:solidFill>
+                <a:srgbClr val="1E1C1C"/>
+              </a:solidFill>
+              <a:latin typeface="Courier" charset="0"/>
+              <a:ea typeface="Courier" charset="0"/>
+              <a:cs typeface="Courier" charset="0"/>
+              <a:sym typeface="Consolas"/>
+            </a:endParaRPr>
+          </a:p>
+          <a:p>
+            <a:pPr marL="0" indent="0">
+              <a:buNone/>
+              <a:defRPr sz="1800">
+                <a:solidFill>
+                  <a:srgbClr val="000000"/>
+                </a:solidFill>
+              </a:defRPr>
+            </a:pPr>
+            <a:r>
+              <a:rPr lang="en-US" sz="1100" dirty="0">
+                <a:solidFill>
+                  <a:srgbClr val="1BB2E2"/>
+                </a:solidFill>
+                <a:latin typeface="Courier" charset="0"/>
+                <a:ea typeface="Courier" charset="0"/>
+                <a:cs typeface="Courier" charset="0"/>
+                <a:sym typeface="Consolas"/>
+              </a:rPr>
+              <a:t>//opening a bucket in the cluster</a:t>
+            </a:r>
+          </a:p>
+          <a:p>
+            <a:pPr marL="0" indent="0">
+              <a:buNone/>
+              <a:defRPr sz="1800">
+                <a:solidFill>
+                  <a:srgbClr val="000000"/>
+                </a:solidFill>
+              </a:defRPr>
+            </a:pPr>
+            <a:r>
+              <a:rPr lang="en-US" sz="1100" dirty="0">
+                <a:solidFill>
+                  <a:srgbClr val="1E1C1C"/>
+                </a:solidFill>
+                <a:latin typeface="Courier" charset="0"/>
+                <a:ea typeface="Courier" charset="0"/>
+                <a:cs typeface="Courier" charset="0"/>
+                <a:sym typeface="Consolas"/>
+              </a:rPr>
+              <a:t>_bucket = </a:t>
+            </a:r>
+            <a:r>
+              <a:rPr lang="en-US" sz="1100" dirty="0" err="1">
+                <a:solidFill>
+                  <a:srgbClr val="1E1C1C"/>
+                </a:solidFill>
+                <a:latin typeface="Courier" charset="0"/>
+                <a:ea typeface="Courier" charset="0"/>
+                <a:cs typeface="Courier" charset="0"/>
+                <a:sym typeface="Consolas"/>
+              </a:rPr>
+              <a:t>ClusterHelper.GetBucket</a:t>
+            </a:r>
+            <a:r>
+              <a:rPr lang="en-US" sz="1100" dirty="0">
+                <a:solidFill>
+                  <a:srgbClr val="1E1C1C"/>
+                </a:solidFill>
+                <a:latin typeface="Courier" charset="0"/>
+                <a:ea typeface="Courier" charset="0"/>
+                <a:cs typeface="Courier" charset="0"/>
+                <a:sym typeface="Consolas"/>
+              </a:rPr>
+              <a:t>(</a:t>
+            </a:r>
+            <a:r>
+              <a:rPr lang="en-US" sz="1100" dirty="0">
+                <a:solidFill>
+                  <a:srgbClr val="E40121"/>
+                </a:solidFill>
+                <a:latin typeface="Courier" charset="0"/>
+                <a:ea typeface="Courier" charset="0"/>
+                <a:cs typeface="Courier" charset="0"/>
+                <a:sym typeface="Consolas"/>
+              </a:rPr>
+              <a:t>"travel-sample"</a:t>
+            </a:r>
+            <a:r>
+              <a:rPr lang="en-US" sz="1100" dirty="0">
+                <a:solidFill>
+                  <a:srgbClr val="1E1C1C"/>
+                </a:solidFill>
+                <a:latin typeface="Courier" charset="0"/>
+                <a:ea typeface="Courier" charset="0"/>
+                <a:cs typeface="Courier" charset="0"/>
+                <a:sym typeface="Consolas"/>
+              </a:rPr>
+              <a:t>, </a:t>
+            </a:r>
+            <a:r>
+              <a:rPr lang="en-US" sz="1100" dirty="0">
+                <a:solidFill>
+                  <a:srgbClr val="E40121"/>
+                </a:solidFill>
+                <a:latin typeface="Courier" charset="0"/>
+                <a:ea typeface="Courier" charset="0"/>
+                <a:cs typeface="Courier" charset="0"/>
+                <a:sym typeface="Consolas"/>
+              </a:rPr>
+              <a:t>“password"</a:t>
+            </a:r>
+            <a:r>
+              <a:rPr lang="en-US" sz="1100" dirty="0">
+                <a:solidFill>
+                  <a:srgbClr val="1E1C1C"/>
+                </a:solidFill>
+                <a:latin typeface="Courier" charset="0"/>
+                <a:ea typeface="Courier" charset="0"/>
+                <a:cs typeface="Courier" charset="0"/>
+                <a:sym typeface="Consolas"/>
+              </a:rPr>
+              <a:t>);</a:t>
+            </a:r>
+          </a:p>
+          <a:p>
+            <a:pPr marL="0" indent="0">
+              <a:buNone/>
+              <a:defRPr sz="1800">
+                <a:solidFill>
+                  <a:srgbClr val="000000"/>
+                </a:solidFill>
+              </a:defRPr>
+            </a:pPr>
+            <a:endParaRPr lang="en-US" sz="1100" dirty="0">
+              <a:solidFill>
+                <a:srgbClr val="1E1C1C"/>
+              </a:solidFill>
+              <a:latin typeface="Courier" charset="0"/>
+              <a:ea typeface="Courier" charset="0"/>
+              <a:cs typeface="Courier" charset="0"/>
+              <a:sym typeface="Consolas"/>
+            </a:endParaRPr>
+          </a:p>
+          <a:p>
+            <a:pPr marL="0" indent="0">
+              <a:buNone/>
+              <a:defRPr sz="1800">
+                <a:solidFill>
+                  <a:srgbClr val="000000"/>
+                </a:solidFill>
+              </a:defRPr>
+            </a:pPr>
+            <a:r>
+              <a:rPr lang="en-US" sz="1100" dirty="0">
+                <a:solidFill>
+                  <a:srgbClr val="1BB2E2"/>
+                </a:solidFill>
+                <a:latin typeface="Courier" charset="0"/>
+                <a:ea typeface="Courier" charset="0"/>
+                <a:cs typeface="Courier" charset="0"/>
+                <a:sym typeface="Consolas"/>
+              </a:rPr>
+              <a:t>//preparing N1ql</a:t>
+            </a:r>
+          </a:p>
+          <a:p>
+            <a:pPr marL="0" indent="0">
+              <a:buNone/>
+              <a:defRPr sz="1800">
+                <a:solidFill>
+                  <a:srgbClr val="000000"/>
+                </a:solidFill>
+              </a:defRPr>
+            </a:pPr>
+            <a:r>
+              <a:rPr lang="en-US" sz="1100" dirty="0" err="1">
+                <a:solidFill>
+                  <a:srgbClr val="2E2E2C"/>
+                </a:solidFill>
+                <a:latin typeface="Courier" charset="0"/>
+                <a:ea typeface="Courier" charset="0"/>
+                <a:cs typeface="Courier" charset="0"/>
+                <a:sym typeface="Consolas"/>
+              </a:rPr>
+              <a:t>var</a:t>
+            </a:r>
+            <a:r>
+              <a:rPr lang="en-US" sz="1100" dirty="0">
+                <a:solidFill>
+                  <a:srgbClr val="2E2E2C"/>
+                </a:solidFill>
+                <a:latin typeface="Courier" charset="0"/>
+                <a:ea typeface="Courier" charset="0"/>
+                <a:cs typeface="Courier" charset="0"/>
+                <a:sym typeface="Consolas"/>
+              </a:rPr>
+              <a:t> </a:t>
+            </a:r>
+            <a:r>
+              <a:rPr lang="en-US" sz="1100" dirty="0" err="1">
+                <a:solidFill>
+                  <a:srgbClr val="2E2E2C"/>
+                </a:solidFill>
+                <a:latin typeface="Courier" charset="0"/>
+                <a:ea typeface="Courier" charset="0"/>
+                <a:cs typeface="Courier" charset="0"/>
+                <a:sym typeface="Consolas"/>
+              </a:rPr>
+              <a:t>myQuery</a:t>
+            </a:r>
+            <a:r>
+              <a:rPr lang="en-US" sz="1100" dirty="0">
+                <a:solidFill>
+                  <a:srgbClr val="2E2E2C"/>
+                </a:solidFill>
+                <a:latin typeface="Courier" charset="0"/>
+                <a:ea typeface="Courier" charset="0"/>
+                <a:cs typeface="Courier" charset="0"/>
+                <a:sym typeface="Consolas"/>
+              </a:rPr>
+              <a:t> = </a:t>
+            </a:r>
+            <a:r>
+              <a:rPr lang="en-US" sz="1100" dirty="0" err="1">
+                <a:solidFill>
+                  <a:srgbClr val="2E2E2C"/>
+                </a:solidFill>
+                <a:latin typeface="Courier" charset="0"/>
+                <a:ea typeface="Courier" charset="0"/>
+                <a:cs typeface="Courier" charset="0"/>
+                <a:sym typeface="Consolas"/>
+              </a:rPr>
+              <a:t>QueryRequest.Create</a:t>
+            </a:r>
+            <a:r>
+              <a:rPr lang="en-US" sz="1100" dirty="0">
+                <a:solidFill>
+                  <a:srgbClr val="2E2E2C"/>
+                </a:solidFill>
+                <a:latin typeface="Courier" charset="0"/>
+                <a:ea typeface="Courier" charset="0"/>
+                <a:cs typeface="Courier" charset="0"/>
+                <a:sym typeface="Consolas"/>
+              </a:rPr>
+              <a:t>(</a:t>
+            </a:r>
+            <a:r>
+              <a:rPr lang="en-US" sz="1100" dirty="0">
+                <a:solidFill>
+                  <a:srgbClr val="E40121"/>
+                </a:solidFill>
+                <a:latin typeface="Courier" charset="0"/>
+                <a:ea typeface="Courier" charset="0"/>
+                <a:cs typeface="Courier" charset="0"/>
+                <a:sym typeface="Consolas"/>
+              </a:rPr>
+              <a:t>“SELECT * FROM `travel-sample`“</a:t>
+            </a:r>
+            <a:r>
+              <a:rPr lang="en-US" sz="1100" dirty="0">
+                <a:solidFill>
+                  <a:srgbClr val="2E2E2C"/>
+                </a:solidFill>
+                <a:latin typeface="Courier" charset="0"/>
+                <a:ea typeface="Courier" charset="0"/>
+                <a:cs typeface="Courier" charset="0"/>
+                <a:sym typeface="Consolas"/>
+              </a:rPr>
+              <a:t>);</a:t>
+            </a:r>
+          </a:p>
+          <a:p>
+            <a:pPr marL="0" indent="0">
+              <a:buNone/>
+              <a:defRPr sz="1800">
+                <a:solidFill>
+                  <a:srgbClr val="000000"/>
+                </a:solidFill>
+              </a:defRPr>
+            </a:pPr>
+            <a:endParaRPr lang="en-US" sz="1100" dirty="0">
+              <a:solidFill>
+                <a:srgbClr val="1E1C1C"/>
+              </a:solidFill>
+              <a:latin typeface="Courier" charset="0"/>
+              <a:ea typeface="Courier" charset="0"/>
+              <a:cs typeface="Courier" charset="0"/>
+              <a:sym typeface="Consolas"/>
+            </a:endParaRPr>
+          </a:p>
+          <a:p>
+            <a:pPr marL="0" indent="0">
+              <a:buNone/>
+              <a:defRPr sz="1800">
+                <a:solidFill>
+                  <a:srgbClr val="000000"/>
+                </a:solidFill>
+              </a:defRPr>
+            </a:pPr>
+            <a:r>
+              <a:rPr lang="en-US" sz="1100" dirty="0">
+                <a:solidFill>
+                  <a:srgbClr val="1BB2E2"/>
+                </a:solidFill>
+                <a:latin typeface="Courier" charset="0"/>
+                <a:ea typeface="Courier" charset="0"/>
+                <a:cs typeface="Courier" charset="0"/>
+                <a:sym typeface="Consolas"/>
+              </a:rPr>
+              <a:t>//creating and saving a Document</a:t>
+            </a:r>
+          </a:p>
+          <a:p>
+            <a:pPr marL="0" indent="0">
+              <a:buNone/>
+              <a:defRPr sz="1800">
+                <a:solidFill>
+                  <a:srgbClr val="000000"/>
+                </a:solidFill>
+              </a:defRPr>
+            </a:pPr>
+            <a:r>
+              <a:rPr lang="en-US" sz="1100" dirty="0">
+                <a:solidFill>
+                  <a:srgbClr val="2E2E2C"/>
+                </a:solidFill>
+                <a:latin typeface="Courier" charset="0"/>
+                <a:ea typeface="Courier" charset="0"/>
+                <a:cs typeface="Courier" charset="0"/>
+                <a:sym typeface="Consolas"/>
+              </a:rPr>
+              <a:t>_</a:t>
+            </a:r>
+            <a:r>
+              <a:rPr lang="en-US" sz="1100" dirty="0" err="1">
+                <a:solidFill>
+                  <a:srgbClr val="2E2E2C"/>
+                </a:solidFill>
+                <a:latin typeface="Courier" charset="0"/>
+                <a:ea typeface="Courier" charset="0"/>
+                <a:cs typeface="Courier" charset="0"/>
+                <a:sym typeface="Consolas"/>
+              </a:rPr>
+              <a:t>bucket.Insert</a:t>
+            </a:r>
+            <a:r>
+              <a:rPr lang="en-US" sz="1100" dirty="0">
+                <a:solidFill>
+                  <a:srgbClr val="2E2E2C"/>
+                </a:solidFill>
+                <a:latin typeface="Courier" charset="0"/>
+                <a:ea typeface="Courier" charset="0"/>
+                <a:cs typeface="Courier" charset="0"/>
+                <a:sym typeface="Consolas"/>
+              </a:rPr>
+              <a:t>(document);</a:t>
+            </a:r>
           </a:p>
         </p:txBody>
       </p:sp>
     </p:spTree>
     <p:extLst>
       <p:ext uri="{BB962C8B-B14F-4D97-AF65-F5344CB8AC3E}">
-        <p14:creationId xmlns:p14="http://schemas.microsoft.com/office/powerpoint/2010/main" val="1213263617"/>
+        <p14:creationId xmlns:p14="http://schemas.microsoft.com/office/powerpoint/2010/main" val="731843618"/>
       </p:ext>
     </p:extLst>
   </p:cSld>
@@ -9119,7 +9774,7 @@
           <a:p>
             <a:r>
               <a:rPr lang="en-US" dirty="0"/>
-              <a:t>REST API</a:t>
+              <a:t>SDK: Node</a:t>
             </a:r>
           </a:p>
         </p:txBody>
@@ -9134,8 +9789,8 @@
         </p:nvSpPr>
         <p:spPr>
           <a:xfrm>
-            <a:off x="609600" y="838200"/>
-            <a:ext cx="8007739" cy="3394472"/>
+            <a:off x="609600" y="676275"/>
+            <a:ext cx="8007739" cy="2009775"/>
           </a:xfrm>
           <a:prstGeom prst="rect">
             <a:avLst/>
@@ -9302,107 +9957,7 @@
             </a:pPr>
             <a:r>
               <a:rPr lang="en-US" dirty="0"/>
-              <a:t>Cluster</a:t>
-            </a:r>
-          </a:p>
-          <a:p>
-            <a:pPr marL="342900" indent="-342900">
-              <a:buFont typeface="Arial" charset="0"/>
-              <a:buChar char="•"/>
-            </a:pPr>
-            <a:r>
-              <a:rPr lang="en-US" dirty="0"/>
-              <a:t>Nodes</a:t>
-            </a:r>
-          </a:p>
-          <a:p>
-            <a:pPr marL="342900" indent="-342900">
-              <a:buFont typeface="Arial" charset="0"/>
-              <a:buChar char="•"/>
-            </a:pPr>
-            <a:r>
-              <a:rPr lang="en-US" dirty="0"/>
-              <a:t>Server Group (?)</a:t>
-            </a:r>
-          </a:p>
-          <a:p>
-            <a:pPr marL="342900" indent="-342900">
-              <a:buFont typeface="Arial" charset="0"/>
-              <a:buChar char="•"/>
-            </a:pPr>
-            <a:r>
-              <a:rPr lang="en-US" dirty="0"/>
-              <a:t>Buckets</a:t>
-            </a:r>
-          </a:p>
-          <a:p>
-            <a:pPr marL="342900" indent="-342900">
-              <a:buFont typeface="Arial" charset="0"/>
-              <a:buChar char="•"/>
-            </a:pPr>
-            <a:r>
-              <a:rPr lang="en-US" dirty="0"/>
-              <a:t>Indexes</a:t>
-            </a:r>
-          </a:p>
-          <a:p>
-            <a:pPr marL="342900" indent="-342900">
-              <a:buFont typeface="Arial" charset="0"/>
-              <a:buChar char="•"/>
-            </a:pPr>
-            <a:r>
-              <a:rPr lang="en-US" dirty="0"/>
-              <a:t>Views</a:t>
-            </a:r>
-          </a:p>
-          <a:p>
-            <a:pPr marL="342900" indent="-342900">
-              <a:buFont typeface="Arial" charset="0"/>
-              <a:buChar char="•"/>
-            </a:pPr>
-            <a:r>
-              <a:rPr lang="en-US" dirty="0"/>
-              <a:t>XDCR</a:t>
-            </a:r>
-          </a:p>
-          <a:p>
-            <a:pPr marL="342900" indent="-342900">
-              <a:buFont typeface="Arial" charset="0"/>
-              <a:buChar char="•"/>
-            </a:pPr>
-            <a:r>
-              <a:rPr lang="en-US" dirty="0"/>
-              <a:t>Compaction</a:t>
-            </a:r>
-          </a:p>
-          <a:p>
-            <a:pPr marL="342900" indent="-342900">
-              <a:buFont typeface="Arial" charset="0"/>
-              <a:buChar char="•"/>
-            </a:pPr>
-            <a:r>
-              <a:rPr lang="en-US" dirty="0"/>
-              <a:t>Log</a:t>
-            </a:r>
-          </a:p>
-          <a:p>
-            <a:pPr marL="342900" indent="-342900">
-              <a:buFont typeface="Arial" charset="0"/>
-              <a:buChar char="•"/>
-            </a:pPr>
-            <a:r>
-              <a:rPr lang="en-US" dirty="0"/>
-              <a:t>User/Security</a:t>
-            </a:r>
-          </a:p>
-          <a:p>
-            <a:pPr marL="342900" indent="-342900">
-              <a:buFont typeface="Arial" charset="0"/>
-              <a:buChar char="•"/>
-            </a:pPr>
-            <a:r>
-              <a:rPr lang="en-US" dirty="0"/>
-              <a:t>N1QL</a:t>
+              <a:t>How to install</a:t>
             </a:r>
           </a:p>
           <a:p>
@@ -9413,14 +9968,1045 @@
             <a:endParaRPr lang="en-US" dirty="0"/>
           </a:p>
           <a:p>
+            <a:pPr marL="569913" lvl="1" indent="-342900">
+              <a:buFont typeface="Arial" charset="0"/>
+              <a:buChar char="•"/>
+            </a:pPr>
+            <a:r>
+              <a:rPr lang="en-US" dirty="0" err="1"/>
+              <a:t>npm</a:t>
+            </a:r>
+            <a:r>
+              <a:rPr lang="en-US" dirty="0"/>
+              <a:t> install </a:t>
+            </a:r>
+            <a:r>
+              <a:rPr lang="en-US" dirty="0" err="1"/>
+              <a:t>couchbase</a:t>
+            </a:r>
             <a:endParaRPr lang="en-US" dirty="0"/>
+          </a:p>
+          <a:p>
+            <a:pPr marL="569913" lvl="1" indent="-342900">
+              <a:buFont typeface="Arial" charset="0"/>
+              <a:buChar char="•"/>
+            </a:pPr>
+            <a:endParaRPr lang="en-US" dirty="0"/>
+          </a:p>
+          <a:p>
+            <a:pPr marL="342900" indent="-342900">
+              <a:buFont typeface="Arial" charset="0"/>
+              <a:buChar char="•"/>
+            </a:pPr>
+            <a:r>
+              <a:rPr lang="en-US" dirty="0"/>
+              <a:t>How to connect to a </a:t>
+            </a:r>
+            <a:r>
+              <a:rPr lang="en-US" dirty="0" err="1"/>
+              <a:t>Couchbase</a:t>
+            </a:r>
+            <a:r>
+              <a:rPr lang="en-US" dirty="0"/>
+              <a:t> cluster</a:t>
+            </a:r>
+          </a:p>
+          <a:p>
+            <a:pPr marL="342900" indent="-342900">
+              <a:buFont typeface="Arial" charset="0"/>
+              <a:buChar char="•"/>
+            </a:pPr>
+            <a:endParaRPr lang="en-US" dirty="0"/>
+          </a:p>
+          <a:p>
+            <a:pPr marL="342900" indent="-342900">
+              <a:buFont typeface="Arial" charset="0"/>
+              <a:buChar char="•"/>
+            </a:pPr>
+            <a:endParaRPr lang="en-US" dirty="0"/>
+          </a:p>
+          <a:p>
+            <a:endParaRPr lang="en-US" dirty="0"/>
+          </a:p>
+        </p:txBody>
+      </p:sp>
+      <p:sp>
+        <p:nvSpPr>
+          <p:cNvPr id="4" name="Shape 1658"/>
+          <p:cNvSpPr txBox="1">
+            <a:spLocks/>
+          </p:cNvSpPr>
+          <p:nvPr/>
+        </p:nvSpPr>
+        <p:spPr>
+          <a:xfrm>
+            <a:off x="1288661" y="2419349"/>
+            <a:ext cx="6236089" cy="2420551"/>
+          </a:xfrm>
+          <a:prstGeom prst="rect">
+            <a:avLst/>
+          </a:prstGeom>
+        </p:spPr>
+        <p:txBody>
+          <a:bodyPr lIns="0" tIns="0" rIns="0" bIns="0">
+            <a:noAutofit/>
+          </a:bodyPr>
+          <a:lstStyle>
+            <a:lvl1pPr marL="228600" indent="-228600" algn="l" defTabSz="457200" rtl="0" eaLnBrk="1" latinLnBrk="0" hangingPunct="1">
+              <a:spcBef>
+                <a:spcPts val="0"/>
+              </a:spcBef>
+              <a:buClr>
+                <a:schemeClr val="accent1"/>
+              </a:buClr>
+              <a:buFont typeface="Wingdings" charset="2"/>
+              <a:buChar char="§"/>
+              <a:defRPr sz="2400" kern="1200">
+                <a:solidFill>
+                  <a:schemeClr val="tx1"/>
+                </a:solidFill>
+                <a:latin typeface="+mn-lt"/>
+                <a:ea typeface="+mn-ea"/>
+                <a:cs typeface="+mn-cs"/>
+              </a:defRPr>
+            </a:lvl1pPr>
+            <a:lvl2pPr marL="455613" indent="-227013" algn="l" defTabSz="457200" rtl="0" eaLnBrk="1" latinLnBrk="0" hangingPunct="1">
+              <a:spcBef>
+                <a:spcPts val="0"/>
+              </a:spcBef>
+              <a:buClr>
+                <a:srgbClr val="262626"/>
+              </a:buClr>
+              <a:buFont typeface="Wingdings" charset="2"/>
+              <a:buChar char="§"/>
+              <a:defRPr sz="2000" kern="1200">
+                <a:solidFill>
+                  <a:schemeClr val="tx1"/>
+                </a:solidFill>
+                <a:latin typeface="+mn-lt"/>
+                <a:ea typeface="+mn-ea"/>
+                <a:cs typeface="+mn-cs"/>
+              </a:defRPr>
+            </a:lvl2pPr>
+            <a:lvl3pPr marL="455613" indent="-228600" algn="l" defTabSz="457200" rtl="0" eaLnBrk="1" latinLnBrk="0" hangingPunct="1">
+              <a:spcBef>
+                <a:spcPts val="0"/>
+              </a:spcBef>
+              <a:buClr>
+                <a:srgbClr val="262626"/>
+              </a:buClr>
+              <a:buFont typeface="Wingdings" charset="2"/>
+              <a:buChar char="§"/>
+              <a:defRPr sz="2000" kern="1200">
+                <a:solidFill>
+                  <a:schemeClr val="tx1"/>
+                </a:solidFill>
+                <a:latin typeface="+mn-lt"/>
+                <a:ea typeface="+mn-ea"/>
+                <a:cs typeface="+mn-cs"/>
+              </a:defRPr>
+            </a:lvl3pPr>
+            <a:lvl4pPr marL="455613" indent="-228600" algn="l" defTabSz="457200" rtl="0" eaLnBrk="1" latinLnBrk="0" hangingPunct="1">
+              <a:spcBef>
+                <a:spcPts val="0"/>
+              </a:spcBef>
+              <a:buClr>
+                <a:srgbClr val="262626"/>
+              </a:buClr>
+              <a:buFont typeface="Wingdings" charset="2"/>
+              <a:buChar char="§"/>
+              <a:defRPr sz="2000" kern="1200">
+                <a:solidFill>
+                  <a:schemeClr val="tx1"/>
+                </a:solidFill>
+                <a:latin typeface="+mn-lt"/>
+                <a:ea typeface="+mn-ea"/>
+                <a:cs typeface="+mn-cs"/>
+              </a:defRPr>
+            </a:lvl4pPr>
+            <a:lvl5pPr marL="455613" indent="-228600" algn="l" defTabSz="457200" rtl="0" eaLnBrk="1" latinLnBrk="0" hangingPunct="1">
+              <a:spcBef>
+                <a:spcPts val="200"/>
+              </a:spcBef>
+              <a:buClr>
+                <a:srgbClr val="262626"/>
+              </a:buClr>
+              <a:buFont typeface="Wingdings" charset="2"/>
+              <a:buChar char="§"/>
+              <a:defRPr sz="2000" kern="1200">
+                <a:solidFill>
+                  <a:schemeClr val="tx1"/>
+                </a:solidFill>
+                <a:latin typeface="+mn-lt"/>
+                <a:ea typeface="+mn-ea"/>
+                <a:cs typeface="+mn-cs"/>
+              </a:defRPr>
+            </a:lvl5pPr>
+            <a:lvl6pPr marL="2514600" indent="-228600" algn="l" defTabSz="457200" rtl="0" eaLnBrk="1" latinLnBrk="0" hangingPunct="1">
+              <a:spcBef>
+                <a:spcPct val="20000"/>
+              </a:spcBef>
+              <a:buFont typeface="Arial"/>
+              <a:buChar char="•"/>
+              <a:defRPr sz="2000" kern="1200">
+                <a:solidFill>
+                  <a:schemeClr val="tx1"/>
+                </a:solidFill>
+                <a:latin typeface="+mn-lt"/>
+                <a:ea typeface="+mn-ea"/>
+                <a:cs typeface="+mn-cs"/>
+              </a:defRPr>
+            </a:lvl6pPr>
+            <a:lvl7pPr marL="2971800" indent="-228600" algn="l" defTabSz="457200" rtl="0" eaLnBrk="1" latinLnBrk="0" hangingPunct="1">
+              <a:spcBef>
+                <a:spcPct val="20000"/>
+              </a:spcBef>
+              <a:buFont typeface="Arial"/>
+              <a:buChar char="•"/>
+              <a:defRPr sz="2000" kern="1200">
+                <a:solidFill>
+                  <a:schemeClr val="tx1"/>
+                </a:solidFill>
+                <a:latin typeface="+mn-lt"/>
+                <a:ea typeface="+mn-ea"/>
+                <a:cs typeface="+mn-cs"/>
+              </a:defRPr>
+            </a:lvl7pPr>
+            <a:lvl8pPr marL="3429000" indent="-228600" algn="l" defTabSz="457200" rtl="0" eaLnBrk="1" latinLnBrk="0" hangingPunct="1">
+              <a:spcBef>
+                <a:spcPct val="20000"/>
+              </a:spcBef>
+              <a:buFont typeface="Arial"/>
+              <a:buChar char="•"/>
+              <a:defRPr sz="2000" kern="1200">
+                <a:solidFill>
+                  <a:schemeClr val="tx1"/>
+                </a:solidFill>
+                <a:latin typeface="+mn-lt"/>
+                <a:ea typeface="+mn-ea"/>
+                <a:cs typeface="+mn-cs"/>
+              </a:defRPr>
+            </a:lvl8pPr>
+            <a:lvl9pPr marL="3886200" indent="-228600" algn="l" defTabSz="457200" rtl="0" eaLnBrk="1" latinLnBrk="0" hangingPunct="1">
+              <a:spcBef>
+                <a:spcPct val="20000"/>
+              </a:spcBef>
+              <a:buFont typeface="Arial"/>
+              <a:buChar char="•"/>
+              <a:defRPr sz="2000" kern="1200">
+                <a:solidFill>
+                  <a:schemeClr val="tx1"/>
+                </a:solidFill>
+                <a:latin typeface="+mn-lt"/>
+                <a:ea typeface="+mn-ea"/>
+                <a:cs typeface="+mn-cs"/>
+              </a:defRPr>
+            </a:lvl9pPr>
+          </a:lstStyle>
+          <a:p>
+            <a:pPr marL="0" indent="0">
+              <a:buNone/>
+              <a:defRPr sz="1800">
+                <a:solidFill>
+                  <a:srgbClr val="000000"/>
+                </a:solidFill>
+              </a:defRPr>
+            </a:pPr>
+            <a:r>
+              <a:rPr lang="en-US" sz="1100" dirty="0">
+                <a:solidFill>
+                  <a:srgbClr val="1BB2E2"/>
+                </a:solidFill>
+                <a:latin typeface="Courier" charset="0"/>
+                <a:ea typeface="Courier" charset="0"/>
+                <a:cs typeface="Courier" charset="0"/>
+                <a:sym typeface="Consolas"/>
+              </a:rPr>
+              <a:t>//including the Node.js dependency</a:t>
+            </a:r>
+          </a:p>
+          <a:p>
+            <a:pPr marL="0" indent="0">
+              <a:buNone/>
+              <a:defRPr sz="1800">
+                <a:solidFill>
+                  <a:srgbClr val="000000"/>
+                </a:solidFill>
+              </a:defRPr>
+            </a:pPr>
+            <a:r>
+              <a:rPr lang="en-US" sz="1100" dirty="0" err="1">
+                <a:solidFill>
+                  <a:srgbClr val="1E1C1C"/>
+                </a:solidFill>
+                <a:latin typeface="Courier" charset="0"/>
+                <a:ea typeface="Courier" charset="0"/>
+                <a:cs typeface="Courier" charset="0"/>
+                <a:sym typeface="Consolas"/>
+              </a:rPr>
+              <a:t>var</a:t>
+            </a:r>
+            <a:r>
+              <a:rPr lang="en-US" sz="1100" dirty="0">
+                <a:solidFill>
+                  <a:srgbClr val="1E1C1C"/>
+                </a:solidFill>
+                <a:latin typeface="Courier" charset="0"/>
+                <a:ea typeface="Courier" charset="0"/>
+                <a:cs typeface="Courier" charset="0"/>
+                <a:sym typeface="Consolas"/>
+              </a:rPr>
+              <a:t> </a:t>
+            </a:r>
+            <a:r>
+              <a:rPr lang="en-US" sz="1100" dirty="0" err="1">
+                <a:solidFill>
+                  <a:srgbClr val="1E1C1C"/>
+                </a:solidFill>
+                <a:latin typeface="Courier" charset="0"/>
+                <a:ea typeface="Courier" charset="0"/>
+                <a:cs typeface="Courier" charset="0"/>
+                <a:sym typeface="Consolas"/>
+              </a:rPr>
+              <a:t>Couchbase</a:t>
+            </a:r>
+            <a:r>
+              <a:rPr lang="en-US" sz="1100" dirty="0">
+                <a:solidFill>
+                  <a:srgbClr val="1E1C1C"/>
+                </a:solidFill>
+                <a:latin typeface="Courier" charset="0"/>
+                <a:ea typeface="Courier" charset="0"/>
+                <a:cs typeface="Courier" charset="0"/>
+                <a:sym typeface="Consolas"/>
+              </a:rPr>
+              <a:t> = require(</a:t>
+            </a:r>
+            <a:r>
+              <a:rPr lang="en-US" sz="1100" dirty="0">
+                <a:solidFill>
+                  <a:srgbClr val="E40121"/>
+                </a:solidFill>
+                <a:latin typeface="Courier" charset="0"/>
+                <a:ea typeface="Courier" charset="0"/>
+                <a:cs typeface="Courier" charset="0"/>
+                <a:sym typeface="Consolas"/>
+              </a:rPr>
+              <a:t>”</a:t>
+            </a:r>
+            <a:r>
+              <a:rPr lang="en-US" sz="1100" dirty="0" err="1">
+                <a:solidFill>
+                  <a:srgbClr val="E40121"/>
+                </a:solidFill>
+                <a:latin typeface="Courier" charset="0"/>
+                <a:ea typeface="Courier" charset="0"/>
+                <a:cs typeface="Courier" charset="0"/>
+                <a:sym typeface="Consolas"/>
+              </a:rPr>
+              <a:t>couchbase</a:t>
+            </a:r>
+            <a:r>
+              <a:rPr lang="en-US" sz="1100" dirty="0">
+                <a:solidFill>
+                  <a:srgbClr val="E40121"/>
+                </a:solidFill>
+                <a:latin typeface="Courier" charset="0"/>
+                <a:ea typeface="Courier" charset="0"/>
+                <a:cs typeface="Courier" charset="0"/>
+                <a:sym typeface="Consolas"/>
+              </a:rPr>
+              <a:t>"</a:t>
+            </a:r>
+            <a:r>
+              <a:rPr lang="en-US" sz="1100" dirty="0">
+                <a:solidFill>
+                  <a:srgbClr val="1E1C1C"/>
+                </a:solidFill>
+                <a:latin typeface="Courier" charset="0"/>
+                <a:ea typeface="Courier" charset="0"/>
+                <a:cs typeface="Courier" charset="0"/>
+                <a:sym typeface="Consolas"/>
+              </a:rPr>
+              <a:t>);</a:t>
+            </a:r>
+          </a:p>
+          <a:p>
+            <a:pPr marL="0" indent="0">
+              <a:buNone/>
+              <a:defRPr sz="1800">
+                <a:solidFill>
+                  <a:srgbClr val="000000"/>
+                </a:solidFill>
+              </a:defRPr>
+            </a:pPr>
+            <a:endParaRPr lang="en-US" sz="1100" dirty="0">
+              <a:solidFill>
+                <a:srgbClr val="1E1C1C"/>
+              </a:solidFill>
+              <a:latin typeface="Courier" charset="0"/>
+              <a:ea typeface="Courier" charset="0"/>
+              <a:cs typeface="Courier" charset="0"/>
+              <a:sym typeface="Consolas"/>
+            </a:endParaRPr>
+          </a:p>
+          <a:p>
+            <a:pPr marL="0" indent="0">
+              <a:buNone/>
+              <a:defRPr sz="1800">
+                <a:solidFill>
+                  <a:srgbClr val="000000"/>
+                </a:solidFill>
+              </a:defRPr>
+            </a:pPr>
+            <a:r>
+              <a:rPr lang="en-US" sz="1100" dirty="0">
+                <a:solidFill>
+                  <a:srgbClr val="1BB2E2"/>
+                </a:solidFill>
+                <a:latin typeface="Courier" charset="0"/>
+                <a:ea typeface="Courier" charset="0"/>
+                <a:cs typeface="Courier" charset="0"/>
+                <a:sym typeface="Consolas"/>
+              </a:rPr>
+              <a:t>//connecting to a </a:t>
+            </a:r>
+            <a:r>
+              <a:rPr lang="en-US" sz="1100" dirty="0" err="1">
+                <a:solidFill>
+                  <a:srgbClr val="1BB2E2"/>
+                </a:solidFill>
+                <a:latin typeface="Courier" charset="0"/>
+                <a:ea typeface="Courier" charset="0"/>
+                <a:cs typeface="Courier" charset="0"/>
+                <a:sym typeface="Consolas"/>
+              </a:rPr>
+              <a:t>Couchbase</a:t>
+            </a:r>
+            <a:r>
+              <a:rPr lang="en-US" sz="1100" dirty="0">
+                <a:solidFill>
+                  <a:srgbClr val="1BB2E2"/>
+                </a:solidFill>
+                <a:latin typeface="Courier" charset="0"/>
+                <a:ea typeface="Courier" charset="0"/>
+                <a:cs typeface="Courier" charset="0"/>
+                <a:sym typeface="Consolas"/>
+              </a:rPr>
+              <a:t> cluster</a:t>
+            </a:r>
+          </a:p>
+          <a:p>
+            <a:pPr marL="0" indent="0">
+              <a:buNone/>
+              <a:defRPr sz="1800">
+                <a:solidFill>
+                  <a:srgbClr val="000000"/>
+                </a:solidFill>
+              </a:defRPr>
+            </a:pPr>
+            <a:r>
+              <a:rPr lang="en-US" sz="1100" dirty="0" err="1">
+                <a:solidFill>
+                  <a:srgbClr val="1E1C1C"/>
+                </a:solidFill>
+                <a:latin typeface="Courier" charset="0"/>
+                <a:ea typeface="Courier" charset="0"/>
+                <a:cs typeface="Courier" charset="0"/>
+                <a:sym typeface="Consolas"/>
+              </a:rPr>
+              <a:t>var</a:t>
+            </a:r>
+            <a:r>
+              <a:rPr lang="en-US" sz="1100" dirty="0">
+                <a:solidFill>
+                  <a:srgbClr val="1E1C1C"/>
+                </a:solidFill>
+                <a:latin typeface="Courier" charset="0"/>
+                <a:ea typeface="Courier" charset="0"/>
+                <a:cs typeface="Courier" charset="0"/>
+                <a:sym typeface="Consolas"/>
+              </a:rPr>
+              <a:t> cluster = new </a:t>
+            </a:r>
+            <a:r>
+              <a:rPr lang="en-US" sz="1100" dirty="0" err="1">
+                <a:solidFill>
+                  <a:srgbClr val="1E1C1C"/>
+                </a:solidFill>
+                <a:latin typeface="Courier" charset="0"/>
+                <a:ea typeface="Courier" charset="0"/>
+                <a:cs typeface="Courier" charset="0"/>
+                <a:sym typeface="Consolas"/>
+              </a:rPr>
+              <a:t>Couchbase.Cluster</a:t>
+            </a:r>
+            <a:r>
+              <a:rPr lang="en-US" sz="1100" dirty="0">
+                <a:solidFill>
+                  <a:srgbClr val="1E1C1C"/>
+                </a:solidFill>
+                <a:latin typeface="Courier" charset="0"/>
+                <a:ea typeface="Courier" charset="0"/>
+                <a:cs typeface="Courier" charset="0"/>
+                <a:sym typeface="Consolas"/>
+              </a:rPr>
+              <a:t>(</a:t>
+            </a:r>
+            <a:r>
+              <a:rPr lang="en-US" sz="1100" dirty="0">
+                <a:solidFill>
+                  <a:srgbClr val="E40121"/>
+                </a:solidFill>
+                <a:latin typeface="Courier" charset="0"/>
+                <a:ea typeface="Courier" charset="0"/>
+                <a:cs typeface="Courier" charset="0"/>
+                <a:sym typeface="Consolas"/>
+              </a:rPr>
+              <a:t>"</a:t>
+            </a:r>
+            <a:r>
+              <a:rPr lang="en-US" sz="1100" dirty="0" err="1">
+                <a:solidFill>
+                  <a:srgbClr val="E40121"/>
+                </a:solidFill>
+                <a:latin typeface="Courier" charset="0"/>
+                <a:ea typeface="Courier" charset="0"/>
+                <a:cs typeface="Courier" charset="0"/>
+                <a:sym typeface="Consolas"/>
+              </a:rPr>
+              <a:t>couchbase</a:t>
+            </a:r>
+            <a:r>
+              <a:rPr lang="en-US" sz="1100" dirty="0">
+                <a:solidFill>
+                  <a:srgbClr val="E40121"/>
+                </a:solidFill>
+                <a:latin typeface="Courier" charset="0"/>
+                <a:ea typeface="Courier" charset="0"/>
+                <a:cs typeface="Courier" charset="0"/>
+                <a:sym typeface="Consolas"/>
+              </a:rPr>
+              <a:t>://localhost:8091"</a:t>
+            </a:r>
+            <a:r>
+              <a:rPr lang="en-US" sz="1100" dirty="0">
+                <a:solidFill>
+                  <a:srgbClr val="1E1C1C"/>
+                </a:solidFill>
+                <a:latin typeface="Courier" charset="0"/>
+                <a:ea typeface="Courier" charset="0"/>
+                <a:cs typeface="Courier" charset="0"/>
+                <a:sym typeface="Consolas"/>
+              </a:rPr>
+              <a:t>);</a:t>
+            </a:r>
+          </a:p>
+          <a:p>
+            <a:pPr marL="0" indent="0">
+              <a:buNone/>
+              <a:defRPr sz="1800">
+                <a:solidFill>
+                  <a:srgbClr val="000000"/>
+                </a:solidFill>
+              </a:defRPr>
+            </a:pPr>
+            <a:endParaRPr lang="en-US" sz="1100" dirty="0">
+              <a:solidFill>
+                <a:srgbClr val="1E1C1C"/>
+              </a:solidFill>
+              <a:latin typeface="Courier" charset="0"/>
+              <a:ea typeface="Courier" charset="0"/>
+              <a:cs typeface="Courier" charset="0"/>
+              <a:sym typeface="Consolas"/>
+            </a:endParaRPr>
+          </a:p>
+          <a:p>
+            <a:pPr marL="0" indent="0">
+              <a:buNone/>
+              <a:defRPr sz="1800">
+                <a:solidFill>
+                  <a:srgbClr val="000000"/>
+                </a:solidFill>
+              </a:defRPr>
+            </a:pPr>
+            <a:r>
+              <a:rPr lang="en-US" sz="1100" dirty="0">
+                <a:solidFill>
+                  <a:srgbClr val="1BB2E2"/>
+                </a:solidFill>
+                <a:latin typeface="Courier" charset="0"/>
+                <a:ea typeface="Courier" charset="0"/>
+                <a:cs typeface="Courier" charset="0"/>
+                <a:sym typeface="Consolas"/>
+              </a:rPr>
+              <a:t>//opening a bucket in the cluster</a:t>
+            </a:r>
+          </a:p>
+          <a:p>
+            <a:pPr marL="0" indent="0">
+              <a:buNone/>
+              <a:defRPr sz="1800">
+                <a:solidFill>
+                  <a:srgbClr val="000000"/>
+                </a:solidFill>
+              </a:defRPr>
+            </a:pPr>
+            <a:r>
+              <a:rPr lang="en-US" sz="1100" dirty="0" err="1">
+                <a:solidFill>
+                  <a:srgbClr val="1E1C1C"/>
+                </a:solidFill>
+                <a:latin typeface="Courier" charset="0"/>
+                <a:ea typeface="Courier" charset="0"/>
+                <a:cs typeface="Courier" charset="0"/>
+                <a:sym typeface="Consolas"/>
+              </a:rPr>
+              <a:t>var</a:t>
+            </a:r>
+            <a:r>
+              <a:rPr lang="en-US" sz="1100" dirty="0">
+                <a:solidFill>
+                  <a:srgbClr val="1E1C1C"/>
+                </a:solidFill>
+                <a:latin typeface="Courier" charset="0"/>
+                <a:ea typeface="Courier" charset="0"/>
+                <a:cs typeface="Courier" charset="0"/>
+                <a:sym typeface="Consolas"/>
+              </a:rPr>
+              <a:t> </a:t>
+            </a:r>
+            <a:r>
+              <a:rPr lang="en-US" sz="1100" dirty="0" err="1">
+                <a:solidFill>
+                  <a:srgbClr val="1E1C1C"/>
+                </a:solidFill>
+                <a:latin typeface="Courier" charset="0"/>
+                <a:ea typeface="Courier" charset="0"/>
+                <a:cs typeface="Courier" charset="0"/>
+                <a:sym typeface="Consolas"/>
+              </a:rPr>
+              <a:t>myBucket</a:t>
+            </a:r>
+            <a:r>
+              <a:rPr lang="en-US" sz="1100" dirty="0">
+                <a:solidFill>
+                  <a:srgbClr val="1E1C1C"/>
+                </a:solidFill>
+                <a:latin typeface="Courier" charset="0"/>
+                <a:ea typeface="Courier" charset="0"/>
+                <a:cs typeface="Courier" charset="0"/>
+                <a:sym typeface="Consolas"/>
+              </a:rPr>
+              <a:t> = </a:t>
+            </a:r>
+            <a:r>
+              <a:rPr lang="en-US" sz="1100" dirty="0" err="1">
+                <a:solidFill>
+                  <a:srgbClr val="1E1C1C"/>
+                </a:solidFill>
+                <a:latin typeface="Courier" charset="0"/>
+                <a:ea typeface="Courier" charset="0"/>
+                <a:cs typeface="Courier" charset="0"/>
+                <a:sym typeface="Consolas"/>
+              </a:rPr>
+              <a:t>cluster.openBucket</a:t>
+            </a:r>
+            <a:r>
+              <a:rPr lang="en-US" sz="1100" dirty="0">
+                <a:solidFill>
+                  <a:srgbClr val="1E1C1C"/>
+                </a:solidFill>
+                <a:latin typeface="Courier" charset="0"/>
+                <a:ea typeface="Courier" charset="0"/>
+                <a:cs typeface="Courier" charset="0"/>
+                <a:sym typeface="Consolas"/>
+              </a:rPr>
+              <a:t>(</a:t>
+            </a:r>
+            <a:r>
+              <a:rPr lang="en-US" sz="1100" dirty="0">
+                <a:solidFill>
+                  <a:srgbClr val="E40121"/>
+                </a:solidFill>
+                <a:latin typeface="Courier" charset="0"/>
+                <a:ea typeface="Courier" charset="0"/>
+                <a:cs typeface="Courier" charset="0"/>
+                <a:sym typeface="Consolas"/>
+              </a:rPr>
+              <a:t>"travel-sample"</a:t>
+            </a:r>
+            <a:r>
+              <a:rPr lang="en-US" sz="1100" dirty="0">
+                <a:solidFill>
+                  <a:srgbClr val="1E1C1C"/>
+                </a:solidFill>
+                <a:latin typeface="Courier" charset="0"/>
+                <a:ea typeface="Courier" charset="0"/>
+                <a:cs typeface="Courier" charset="0"/>
+                <a:sym typeface="Consolas"/>
+              </a:rPr>
+              <a:t>, </a:t>
+            </a:r>
+            <a:r>
+              <a:rPr lang="en-US" sz="1100" dirty="0">
+                <a:solidFill>
+                  <a:srgbClr val="E40121"/>
+                </a:solidFill>
+                <a:latin typeface="Courier" charset="0"/>
+                <a:ea typeface="Courier" charset="0"/>
+                <a:cs typeface="Courier" charset="0"/>
+                <a:sym typeface="Consolas"/>
+              </a:rPr>
+              <a:t>“password"</a:t>
+            </a:r>
+            <a:r>
+              <a:rPr lang="en-US" sz="1100" dirty="0">
+                <a:solidFill>
+                  <a:srgbClr val="1E1C1C"/>
+                </a:solidFill>
+                <a:latin typeface="Courier" charset="0"/>
+                <a:ea typeface="Courier" charset="0"/>
+                <a:cs typeface="Courier" charset="0"/>
+                <a:sym typeface="Consolas"/>
+              </a:rPr>
+              <a:t>);</a:t>
+            </a:r>
+          </a:p>
+          <a:p>
+            <a:pPr marL="0" indent="0">
+              <a:buNone/>
+              <a:defRPr sz="1800">
+                <a:solidFill>
+                  <a:srgbClr val="000000"/>
+                </a:solidFill>
+              </a:defRPr>
+            </a:pPr>
+            <a:endParaRPr lang="en-US" sz="1100" dirty="0">
+              <a:solidFill>
+                <a:srgbClr val="1E1C1C"/>
+              </a:solidFill>
+              <a:latin typeface="Courier" charset="0"/>
+              <a:ea typeface="Courier" charset="0"/>
+              <a:cs typeface="Courier" charset="0"/>
+              <a:sym typeface="Consolas"/>
+            </a:endParaRPr>
+          </a:p>
+          <a:p>
+            <a:pPr marL="0" indent="0">
+              <a:buNone/>
+              <a:defRPr sz="1800">
+                <a:solidFill>
+                  <a:srgbClr val="000000"/>
+                </a:solidFill>
+              </a:defRPr>
+            </a:pPr>
+            <a:r>
+              <a:rPr lang="en-US" sz="1100" dirty="0">
+                <a:solidFill>
+                  <a:srgbClr val="1BB2E2"/>
+                </a:solidFill>
+                <a:latin typeface="Courier" charset="0"/>
+                <a:ea typeface="Courier" charset="0"/>
+                <a:cs typeface="Courier" charset="0"/>
+                <a:sym typeface="Consolas"/>
+              </a:rPr>
+              <a:t>//preparing N1ql</a:t>
+            </a:r>
+          </a:p>
+          <a:p>
+            <a:pPr marL="0" indent="0">
+              <a:buNone/>
+              <a:defRPr sz="1800">
+                <a:solidFill>
+                  <a:srgbClr val="000000"/>
+                </a:solidFill>
+              </a:defRPr>
+            </a:pPr>
+            <a:r>
+              <a:rPr lang="en-US" sz="1100" dirty="0" err="1">
+                <a:solidFill>
+                  <a:srgbClr val="2E2E2C"/>
+                </a:solidFill>
+                <a:latin typeface="Courier" charset="0"/>
+                <a:ea typeface="Courier" charset="0"/>
+                <a:cs typeface="Courier" charset="0"/>
+                <a:sym typeface="Consolas"/>
+              </a:rPr>
+              <a:t>var</a:t>
+            </a:r>
+            <a:r>
+              <a:rPr lang="en-US" sz="1100" dirty="0">
+                <a:solidFill>
+                  <a:srgbClr val="2E2E2C"/>
+                </a:solidFill>
+                <a:latin typeface="Courier" charset="0"/>
+                <a:ea typeface="Courier" charset="0"/>
+                <a:cs typeface="Courier" charset="0"/>
+                <a:sym typeface="Consolas"/>
+              </a:rPr>
+              <a:t> </a:t>
+            </a:r>
+            <a:r>
+              <a:rPr lang="en-US" sz="1100" dirty="0" err="1">
+                <a:solidFill>
+                  <a:srgbClr val="2E2E2C"/>
+                </a:solidFill>
+                <a:latin typeface="Courier" charset="0"/>
+                <a:ea typeface="Courier" charset="0"/>
+                <a:cs typeface="Courier" charset="0"/>
+                <a:sym typeface="Consolas"/>
+              </a:rPr>
+              <a:t>myQuery</a:t>
+            </a:r>
+            <a:r>
+              <a:rPr lang="en-US" sz="1100" dirty="0">
+                <a:solidFill>
+                  <a:srgbClr val="2E2E2C"/>
+                </a:solidFill>
+                <a:latin typeface="Courier" charset="0"/>
+                <a:ea typeface="Courier" charset="0"/>
+                <a:cs typeface="Courier" charset="0"/>
+                <a:sym typeface="Consolas"/>
+              </a:rPr>
+              <a:t> = Couchbase.N1qlQuery();</a:t>
+            </a:r>
+          </a:p>
+          <a:p>
+            <a:pPr marL="0" indent="0">
+              <a:buNone/>
+              <a:defRPr sz="1800">
+                <a:solidFill>
+                  <a:srgbClr val="000000"/>
+                </a:solidFill>
+              </a:defRPr>
+            </a:pPr>
+            <a:endParaRPr lang="en-US" sz="1100" dirty="0">
+              <a:solidFill>
+                <a:srgbClr val="1E1C1C"/>
+              </a:solidFill>
+              <a:latin typeface="Courier" charset="0"/>
+              <a:ea typeface="Courier" charset="0"/>
+              <a:cs typeface="Courier" charset="0"/>
+              <a:sym typeface="Consolas"/>
+            </a:endParaRPr>
+          </a:p>
+          <a:p>
+            <a:pPr marL="0" indent="0">
+              <a:buNone/>
+              <a:defRPr sz="1800">
+                <a:solidFill>
+                  <a:srgbClr val="000000"/>
+                </a:solidFill>
+              </a:defRPr>
+            </a:pPr>
+            <a:r>
+              <a:rPr lang="en-US" sz="1100" dirty="0">
+                <a:solidFill>
+                  <a:srgbClr val="1BB2E2"/>
+                </a:solidFill>
+                <a:latin typeface="Courier" charset="0"/>
+                <a:ea typeface="Courier" charset="0"/>
+                <a:cs typeface="Courier" charset="0"/>
+                <a:sym typeface="Consolas"/>
+              </a:rPr>
+              <a:t>//creating and saving a Document</a:t>
+            </a:r>
+          </a:p>
+          <a:p>
+            <a:pPr marL="0" indent="0">
+              <a:buNone/>
+              <a:defRPr sz="1800">
+                <a:solidFill>
+                  <a:srgbClr val="000000"/>
+                </a:solidFill>
+              </a:defRPr>
+            </a:pPr>
+            <a:r>
+              <a:rPr lang="en-US" sz="1100" dirty="0" err="1">
+                <a:solidFill>
+                  <a:srgbClr val="2E2E2C"/>
+                </a:solidFill>
+                <a:latin typeface="Courier" charset="0"/>
+                <a:ea typeface="Courier" charset="0"/>
+                <a:cs typeface="Courier" charset="0"/>
+                <a:sym typeface="Consolas"/>
+              </a:rPr>
+              <a:t>var</a:t>
+            </a:r>
+            <a:r>
+              <a:rPr lang="en-US" sz="1100" dirty="0">
+                <a:solidFill>
+                  <a:srgbClr val="2E2E2C"/>
+                </a:solidFill>
+                <a:latin typeface="Courier" charset="0"/>
+                <a:ea typeface="Courier" charset="0"/>
+                <a:cs typeface="Courier" charset="0"/>
+                <a:sym typeface="Consolas"/>
+              </a:rPr>
+              <a:t> document = { </a:t>
+            </a:r>
+            <a:r>
+              <a:rPr lang="en-US" sz="1100" dirty="0" err="1">
+                <a:solidFill>
+                  <a:srgbClr val="2E2E2C"/>
+                </a:solidFill>
+                <a:latin typeface="Courier" charset="0"/>
+                <a:ea typeface="Courier" charset="0"/>
+                <a:cs typeface="Courier" charset="0"/>
+                <a:sym typeface="Consolas"/>
+              </a:rPr>
+              <a:t>firstname</a:t>
+            </a:r>
+            <a:r>
+              <a:rPr lang="en-US" sz="1100" dirty="0">
+                <a:solidFill>
+                  <a:srgbClr val="2E2E2C"/>
+                </a:solidFill>
+                <a:latin typeface="Courier" charset="0"/>
+                <a:ea typeface="Courier" charset="0"/>
+                <a:cs typeface="Courier" charset="0"/>
+                <a:sym typeface="Consolas"/>
+              </a:rPr>
+              <a:t>: </a:t>
+            </a:r>
+            <a:r>
+              <a:rPr lang="en-US" sz="1100" dirty="0">
+                <a:solidFill>
+                  <a:srgbClr val="E40121"/>
+                </a:solidFill>
+                <a:latin typeface="Courier" charset="0"/>
+                <a:ea typeface="Courier" charset="0"/>
+                <a:cs typeface="Courier" charset="0"/>
+                <a:sym typeface="Consolas"/>
+              </a:rPr>
+              <a:t>“Matt"</a:t>
+            </a:r>
+            <a:r>
+              <a:rPr lang="en-US" sz="1100" dirty="0">
+                <a:solidFill>
+                  <a:srgbClr val="2E2E2C"/>
+                </a:solidFill>
+                <a:latin typeface="Courier" charset="0"/>
+                <a:ea typeface="Courier" charset="0"/>
+                <a:cs typeface="Courier" charset="0"/>
+                <a:sym typeface="Consolas"/>
+              </a:rPr>
+              <a:t>, </a:t>
+            </a:r>
+            <a:r>
+              <a:rPr lang="en-US" sz="1100" dirty="0" err="1">
+                <a:solidFill>
+                  <a:srgbClr val="2E2E2C"/>
+                </a:solidFill>
+                <a:latin typeface="Courier" charset="0"/>
+                <a:ea typeface="Courier" charset="0"/>
+                <a:cs typeface="Courier" charset="0"/>
+                <a:sym typeface="Consolas"/>
+              </a:rPr>
+              <a:t>lastname</a:t>
+            </a:r>
+            <a:r>
+              <a:rPr lang="en-US" sz="1100" dirty="0">
+                <a:solidFill>
+                  <a:srgbClr val="2E2E2C"/>
+                </a:solidFill>
+                <a:latin typeface="Courier" charset="0"/>
+                <a:ea typeface="Courier" charset="0"/>
+                <a:cs typeface="Courier" charset="0"/>
+                <a:sym typeface="Consolas"/>
+              </a:rPr>
+              <a:t>: </a:t>
+            </a:r>
+            <a:r>
+              <a:rPr lang="en-US" sz="1100" dirty="0">
+                <a:solidFill>
+                  <a:srgbClr val="E40121"/>
+                </a:solidFill>
+                <a:latin typeface="Courier" charset="0"/>
+                <a:ea typeface="Courier" charset="0"/>
+                <a:cs typeface="Courier" charset="0"/>
+                <a:sym typeface="Consolas"/>
+              </a:rPr>
+              <a:t>“Groves“ </a:t>
+            </a:r>
+            <a:r>
+              <a:rPr lang="en-US" sz="1100" dirty="0">
+                <a:solidFill>
+                  <a:srgbClr val="2E2E2C"/>
+                </a:solidFill>
+                <a:latin typeface="Courier" charset="0"/>
+                <a:ea typeface="Courier" charset="0"/>
+                <a:cs typeface="Courier" charset="0"/>
+                <a:sym typeface="Consolas"/>
+              </a:rPr>
+              <a:t>};</a:t>
+            </a:r>
+          </a:p>
+          <a:p>
+            <a:pPr marL="0" indent="0">
+              <a:buNone/>
+              <a:defRPr sz="1800">
+                <a:solidFill>
+                  <a:srgbClr val="000000"/>
+                </a:solidFill>
+              </a:defRPr>
+            </a:pPr>
+            <a:r>
+              <a:rPr lang="en-US" sz="1100" dirty="0" err="1">
+                <a:solidFill>
+                  <a:srgbClr val="2E2E2C"/>
+                </a:solidFill>
+                <a:latin typeface="Courier" charset="0"/>
+                <a:ea typeface="Courier" charset="0"/>
+                <a:cs typeface="Courier" charset="0"/>
+                <a:sym typeface="Consolas"/>
+              </a:rPr>
+              <a:t>myBucket.insert</a:t>
+            </a:r>
+            <a:r>
+              <a:rPr lang="en-US" sz="1100" dirty="0">
+                <a:solidFill>
+                  <a:srgbClr val="2E2E2C"/>
+                </a:solidFill>
+                <a:latin typeface="Courier" charset="0"/>
+                <a:ea typeface="Courier" charset="0"/>
+                <a:cs typeface="Courier" charset="0"/>
+                <a:sym typeface="Consolas"/>
+              </a:rPr>
+              <a:t>(</a:t>
+            </a:r>
+            <a:r>
+              <a:rPr lang="en-US" sz="1100" dirty="0">
+                <a:solidFill>
+                  <a:srgbClr val="E40121"/>
+                </a:solidFill>
+                <a:latin typeface="Courier" charset="0"/>
+                <a:ea typeface="Courier" charset="0"/>
+                <a:cs typeface="Courier" charset="0"/>
+                <a:sym typeface="Consolas"/>
+              </a:rPr>
+              <a:t>"my-key"</a:t>
+            </a:r>
+            <a:r>
+              <a:rPr lang="en-US" sz="1100" dirty="0">
+                <a:solidFill>
+                  <a:srgbClr val="2E2E2C"/>
+                </a:solidFill>
+                <a:latin typeface="Courier" charset="0"/>
+                <a:ea typeface="Courier" charset="0"/>
+                <a:cs typeface="Courier" charset="0"/>
+                <a:sym typeface="Consolas"/>
+              </a:rPr>
+              <a:t>, document, function(error, result) {});</a:t>
+            </a:r>
           </a:p>
         </p:txBody>
       </p:sp>
     </p:spTree>
     <p:extLst>
       <p:ext uri="{BB962C8B-B14F-4D97-AF65-F5344CB8AC3E}">
-        <p14:creationId xmlns:p14="http://schemas.microsoft.com/office/powerpoint/2010/main" val="3571174370"/>
+        <p14:creationId xmlns:p14="http://schemas.microsoft.com/office/powerpoint/2010/main" val="181234665"/>
       </p:ext>
     </p:extLst>
   </p:cSld>
@@ -9464,7 +11050,7 @@
           <a:p>
             <a:r>
               <a:rPr lang="en-US" dirty="0"/>
-              <a:t>SDK: .NET</a:t>
+              <a:t>SDK: Java</a:t>
             </a:r>
           </a:p>
         </p:txBody>
@@ -9651,7 +11237,7 @@
             </a:r>
             <a:r>
               <a:rPr lang="en-US" dirty="0" err="1"/>
-              <a:t>NuGet</a:t>
+              <a:t>todo</a:t>
             </a:r>
             <a:r>
               <a:rPr lang="en-US" dirty="0"/>
@@ -9669,7 +11255,7 @@
             </a:r>
             <a:r>
               <a:rPr lang="en-US" dirty="0" err="1"/>
-              <a:t>ClusterHelper</a:t>
+              <a:t>todo</a:t>
             </a:r>
             <a:r>
               <a:rPr lang="en-US" dirty="0"/>
@@ -9691,7 +11277,7 @@
     </p:spTree>
     <p:extLst>
       <p:ext uri="{BB962C8B-B14F-4D97-AF65-F5344CB8AC3E}">
-        <p14:creationId xmlns:p14="http://schemas.microsoft.com/office/powerpoint/2010/main" val="731843618"/>
+        <p14:creationId xmlns:p14="http://schemas.microsoft.com/office/powerpoint/2010/main" val="1324995767"/>
       </p:ext>
     </p:extLst>
   </p:cSld>

</xml_diff>

<commit_message>
added java example to slide deck 2
</commit_message>
<xml_diff>
--- a/connect2016/developer/02/02.pptx
+++ b/connect2016/developer/02/02.pptx
@@ -267,7 +267,7 @@
           <a:p>
             <a:fld id="{B5389E1E-C654-E943-9883-792E99AD7287}" type="datetimeFigureOut">
               <a:rPr lang="en-US" smtClean="0"/>
-              <a:t>9/20/2016</a:t>
+              <a:t>10/6/2016</a:t>
             </a:fld>
             <a:endParaRPr lang="en-US"/>
           </a:p>
@@ -433,7 +433,7 @@
           <a:p>
             <a:fld id="{9920D99B-2862-464A-984E-65BFC5FC0BBC}" type="datetimeFigureOut">
               <a:rPr lang="en-US" smtClean="0"/>
-              <a:t>9/20/2016</a:t>
+              <a:t>10/6/2016</a:t>
             </a:fld>
             <a:endParaRPr lang="en-US"/>
           </a:p>
@@ -6910,13 +6910,12 @@
             <a:endParaRPr lang="en-US" dirty="0"/>
           </a:p>
           <a:p>
-            <a:pPr marL="569913" lvl="1" indent="-342900">
-              <a:buFont typeface="Arial" charset="0"/>
-              <a:buChar char="•"/>
+            <a:pPr marL="227013" lvl="1" indent="0">
+              <a:buNone/>
             </a:pPr>
             <a:r>
               <a:rPr lang="en-US" dirty="0"/>
-              <a:t>CREATE PRIMARY INDEX on `default`</a:t>
+              <a:t>          CREATE PRIMARY INDEX on `default`</a:t>
             </a:r>
           </a:p>
           <a:p>
@@ -6978,13 +6977,12 @@
             <a:endParaRPr lang="en-US" dirty="0"/>
           </a:p>
           <a:p>
-            <a:pPr marL="569913" lvl="1" indent="-342900">
-              <a:buFont typeface="Arial" charset="0"/>
-              <a:buChar char="•"/>
+            <a:pPr marL="227013" lvl="1" indent="0">
+              <a:buNone/>
             </a:pPr>
             <a:r>
               <a:rPr lang="en-US" dirty="0"/>
-              <a:t>SELECT d.* FROM `default` d</a:t>
+              <a:t>          SELECT d.* FROM `default` d</a:t>
             </a:r>
           </a:p>
           <a:p>
@@ -8333,7 +8331,7 @@
         </p:nvSpPr>
         <p:spPr>
           <a:xfrm>
-            <a:off x="609600" y="838200"/>
+            <a:off x="609600" y="695325"/>
             <a:ext cx="8007739" cy="3394472"/>
           </a:xfrm>
           <a:prstGeom prst="rect">
@@ -8949,8 +8947,8 @@
         </p:nvSpPr>
         <p:spPr>
           <a:xfrm>
-            <a:off x="1546419" y="2409825"/>
-            <a:ext cx="6134100" cy="2409825"/>
+            <a:off x="1546418" y="2409825"/>
+            <a:ext cx="6854631" cy="2409825"/>
           </a:xfrm>
           <a:prstGeom prst="rect">
             <a:avLst/>
@@ -9677,6 +9675,88 @@
                 <a:sym typeface="Consolas"/>
               </a:rPr>
               <a:t>//creating and saving a Document</a:t>
+            </a:r>
+          </a:p>
+          <a:p>
+            <a:pPr marL="0" indent="0">
+              <a:buNone/>
+              <a:defRPr sz="1800">
+                <a:solidFill>
+                  <a:srgbClr val="000000"/>
+                </a:solidFill>
+              </a:defRPr>
+            </a:pPr>
+            <a:r>
+              <a:rPr lang="en-US" sz="1100" dirty="0" err="1">
+                <a:solidFill>
+                  <a:srgbClr val="2E2E2C"/>
+                </a:solidFill>
+                <a:latin typeface="Courier" charset="0"/>
+                <a:ea typeface="Courier" charset="0"/>
+                <a:cs typeface="Courier" charset="0"/>
+                <a:sym typeface="Consolas"/>
+              </a:rPr>
+              <a:t>var</a:t>
+            </a:r>
+            <a:r>
+              <a:rPr lang="en-US" sz="1100" dirty="0">
+                <a:solidFill>
+                  <a:srgbClr val="2E2E2C"/>
+                </a:solidFill>
+                <a:latin typeface="Courier" charset="0"/>
+                <a:ea typeface="Courier" charset="0"/>
+                <a:cs typeface="Courier" charset="0"/>
+                <a:sym typeface="Consolas"/>
+              </a:rPr>
+              <a:t> document = new Document&lt;</a:t>
+            </a:r>
+            <a:r>
+              <a:rPr lang="en-US" sz="1100" dirty="0" err="1">
+                <a:solidFill>
+                  <a:srgbClr val="2E2E2C"/>
+                </a:solidFill>
+                <a:latin typeface="Courier" charset="0"/>
+                <a:ea typeface="Courier" charset="0"/>
+                <a:cs typeface="Courier" charset="0"/>
+                <a:sym typeface="Consolas"/>
+              </a:rPr>
+              <a:t>MyType</a:t>
+            </a:r>
+            <a:r>
+              <a:rPr lang="en-US" sz="1100" dirty="0">
+                <a:solidFill>
+                  <a:srgbClr val="2E2E2C"/>
+                </a:solidFill>
+                <a:latin typeface="Courier" charset="0"/>
+                <a:ea typeface="Courier" charset="0"/>
+                <a:cs typeface="Courier" charset="0"/>
+                <a:sym typeface="Consolas"/>
+              </a:rPr>
+              <a:t>&gt; { Id = “123”, Content = new </a:t>
+            </a:r>
+            <a:r>
+              <a:rPr lang="en-US" sz="1100" dirty="0" err="1">
+                <a:solidFill>
+                  <a:srgbClr val="2E2E2C"/>
+                </a:solidFill>
+                <a:latin typeface="Courier" charset="0"/>
+                <a:ea typeface="Courier" charset="0"/>
+                <a:cs typeface="Courier" charset="0"/>
+                <a:sym typeface="Consolas"/>
+              </a:rPr>
+              <a:t>MyType</a:t>
+            </a:r>
+            <a:r>
+              <a:rPr lang="en-US" sz="1100" dirty="0">
+                <a:solidFill>
+                  <a:srgbClr val="2E2E2C"/>
+                </a:solidFill>
+                <a:latin typeface="Courier" charset="0"/>
+                <a:ea typeface="Courier" charset="0"/>
+                <a:cs typeface="Courier" charset="0"/>
+                <a:sym typeface="Consolas"/>
+              </a:rPr>
+              <a:t>() };</a:t>
             </a:r>
           </a:p>
           <a:p>
@@ -11251,15 +11331,15 @@
             </a:pPr>
             <a:r>
               <a:rPr lang="en-US" dirty="0"/>
-              <a:t>How to use [</a:t>
+              <a:t>How to connect to a </a:t>
             </a:r>
             <a:r>
               <a:rPr lang="en-US" dirty="0" err="1"/>
-              <a:t>todo</a:t>
+              <a:t>Couchbase</a:t>
             </a:r>
             <a:r>
               <a:rPr lang="en-US" dirty="0"/>
-              <a:t>]</a:t>
+              <a:t> cluster</a:t>
             </a:r>
           </a:p>
           <a:p>
@@ -11270,7 +11350,850 @@
             <a:endParaRPr lang="en-US" dirty="0"/>
           </a:p>
           <a:p>
+            <a:pPr marL="342900" indent="-342900">
+              <a:buFont typeface="Arial" charset="0"/>
+              <a:buChar char="•"/>
+            </a:pPr>
             <a:endParaRPr lang="en-US" dirty="0"/>
+          </a:p>
+          <a:p>
+            <a:endParaRPr lang="en-US" dirty="0"/>
+          </a:p>
+        </p:txBody>
+      </p:sp>
+      <p:sp>
+        <p:nvSpPr>
+          <p:cNvPr id="4" name="Shape 1658"/>
+          <p:cNvSpPr txBox="1">
+            <a:spLocks/>
+          </p:cNvSpPr>
+          <p:nvPr/>
+        </p:nvSpPr>
+        <p:spPr>
+          <a:xfrm>
+            <a:off x="1288661" y="1812120"/>
+            <a:ext cx="6236089" cy="2855130"/>
+          </a:xfrm>
+          <a:prstGeom prst="rect">
+            <a:avLst/>
+          </a:prstGeom>
+        </p:spPr>
+        <p:txBody>
+          <a:bodyPr lIns="0" tIns="0" rIns="0" bIns="0">
+            <a:noAutofit/>
+          </a:bodyPr>
+          <a:lstStyle>
+            <a:lvl1pPr marL="228600" indent="-228600" algn="l" defTabSz="457200" rtl="0" eaLnBrk="1" latinLnBrk="0" hangingPunct="1">
+              <a:spcBef>
+                <a:spcPts val="0"/>
+              </a:spcBef>
+              <a:buClr>
+                <a:schemeClr val="accent1"/>
+              </a:buClr>
+              <a:buFont typeface="Wingdings" charset="2"/>
+              <a:buChar char="§"/>
+              <a:defRPr sz="2400" kern="1200">
+                <a:solidFill>
+                  <a:schemeClr val="tx1"/>
+                </a:solidFill>
+                <a:latin typeface="+mn-lt"/>
+                <a:ea typeface="+mn-ea"/>
+                <a:cs typeface="+mn-cs"/>
+              </a:defRPr>
+            </a:lvl1pPr>
+            <a:lvl2pPr marL="455613" indent="-227013" algn="l" defTabSz="457200" rtl="0" eaLnBrk="1" latinLnBrk="0" hangingPunct="1">
+              <a:spcBef>
+                <a:spcPts val="0"/>
+              </a:spcBef>
+              <a:buClr>
+                <a:srgbClr val="262626"/>
+              </a:buClr>
+              <a:buFont typeface="Wingdings" charset="2"/>
+              <a:buChar char="§"/>
+              <a:defRPr sz="2000" kern="1200">
+                <a:solidFill>
+                  <a:schemeClr val="tx1"/>
+                </a:solidFill>
+                <a:latin typeface="+mn-lt"/>
+                <a:ea typeface="+mn-ea"/>
+                <a:cs typeface="+mn-cs"/>
+              </a:defRPr>
+            </a:lvl2pPr>
+            <a:lvl3pPr marL="455613" indent="-228600" algn="l" defTabSz="457200" rtl="0" eaLnBrk="1" latinLnBrk="0" hangingPunct="1">
+              <a:spcBef>
+                <a:spcPts val="0"/>
+              </a:spcBef>
+              <a:buClr>
+                <a:srgbClr val="262626"/>
+              </a:buClr>
+              <a:buFont typeface="Wingdings" charset="2"/>
+              <a:buChar char="§"/>
+              <a:defRPr sz="2000" kern="1200">
+                <a:solidFill>
+                  <a:schemeClr val="tx1"/>
+                </a:solidFill>
+                <a:latin typeface="+mn-lt"/>
+                <a:ea typeface="+mn-ea"/>
+                <a:cs typeface="+mn-cs"/>
+              </a:defRPr>
+            </a:lvl3pPr>
+            <a:lvl4pPr marL="455613" indent="-228600" algn="l" defTabSz="457200" rtl="0" eaLnBrk="1" latinLnBrk="0" hangingPunct="1">
+              <a:spcBef>
+                <a:spcPts val="0"/>
+              </a:spcBef>
+              <a:buClr>
+                <a:srgbClr val="262626"/>
+              </a:buClr>
+              <a:buFont typeface="Wingdings" charset="2"/>
+              <a:buChar char="§"/>
+              <a:defRPr sz="2000" kern="1200">
+                <a:solidFill>
+                  <a:schemeClr val="tx1"/>
+                </a:solidFill>
+                <a:latin typeface="+mn-lt"/>
+                <a:ea typeface="+mn-ea"/>
+                <a:cs typeface="+mn-cs"/>
+              </a:defRPr>
+            </a:lvl4pPr>
+            <a:lvl5pPr marL="455613" indent="-228600" algn="l" defTabSz="457200" rtl="0" eaLnBrk="1" latinLnBrk="0" hangingPunct="1">
+              <a:spcBef>
+                <a:spcPts val="200"/>
+              </a:spcBef>
+              <a:buClr>
+                <a:srgbClr val="262626"/>
+              </a:buClr>
+              <a:buFont typeface="Wingdings" charset="2"/>
+              <a:buChar char="§"/>
+              <a:defRPr sz="2000" kern="1200">
+                <a:solidFill>
+                  <a:schemeClr val="tx1"/>
+                </a:solidFill>
+                <a:latin typeface="+mn-lt"/>
+                <a:ea typeface="+mn-ea"/>
+                <a:cs typeface="+mn-cs"/>
+              </a:defRPr>
+            </a:lvl5pPr>
+            <a:lvl6pPr marL="2514600" indent="-228600" algn="l" defTabSz="457200" rtl="0" eaLnBrk="1" latinLnBrk="0" hangingPunct="1">
+              <a:spcBef>
+                <a:spcPct val="20000"/>
+              </a:spcBef>
+              <a:buFont typeface="Arial"/>
+              <a:buChar char="•"/>
+              <a:defRPr sz="2000" kern="1200">
+                <a:solidFill>
+                  <a:schemeClr val="tx1"/>
+                </a:solidFill>
+                <a:latin typeface="+mn-lt"/>
+                <a:ea typeface="+mn-ea"/>
+                <a:cs typeface="+mn-cs"/>
+              </a:defRPr>
+            </a:lvl6pPr>
+            <a:lvl7pPr marL="2971800" indent="-228600" algn="l" defTabSz="457200" rtl="0" eaLnBrk="1" latinLnBrk="0" hangingPunct="1">
+              <a:spcBef>
+                <a:spcPct val="20000"/>
+              </a:spcBef>
+              <a:buFont typeface="Arial"/>
+              <a:buChar char="•"/>
+              <a:defRPr sz="2000" kern="1200">
+                <a:solidFill>
+                  <a:schemeClr val="tx1"/>
+                </a:solidFill>
+                <a:latin typeface="+mn-lt"/>
+                <a:ea typeface="+mn-ea"/>
+                <a:cs typeface="+mn-cs"/>
+              </a:defRPr>
+            </a:lvl7pPr>
+            <a:lvl8pPr marL="3429000" indent="-228600" algn="l" defTabSz="457200" rtl="0" eaLnBrk="1" latinLnBrk="0" hangingPunct="1">
+              <a:spcBef>
+                <a:spcPct val="20000"/>
+              </a:spcBef>
+              <a:buFont typeface="Arial"/>
+              <a:buChar char="•"/>
+              <a:defRPr sz="2000" kern="1200">
+                <a:solidFill>
+                  <a:schemeClr val="tx1"/>
+                </a:solidFill>
+                <a:latin typeface="+mn-lt"/>
+                <a:ea typeface="+mn-ea"/>
+                <a:cs typeface="+mn-cs"/>
+              </a:defRPr>
+            </a:lvl8pPr>
+            <a:lvl9pPr marL="3886200" indent="-228600" algn="l" defTabSz="457200" rtl="0" eaLnBrk="1" latinLnBrk="0" hangingPunct="1">
+              <a:spcBef>
+                <a:spcPct val="20000"/>
+              </a:spcBef>
+              <a:buFont typeface="Arial"/>
+              <a:buChar char="•"/>
+              <a:defRPr sz="2000" kern="1200">
+                <a:solidFill>
+                  <a:schemeClr val="tx1"/>
+                </a:solidFill>
+                <a:latin typeface="+mn-lt"/>
+                <a:ea typeface="+mn-ea"/>
+                <a:cs typeface="+mn-cs"/>
+              </a:defRPr>
+            </a:lvl9pPr>
+          </a:lstStyle>
+          <a:p>
+            <a:pPr marL="0" indent="0">
+              <a:buNone/>
+              <a:defRPr sz="1800">
+                <a:solidFill>
+                  <a:srgbClr val="000000"/>
+                </a:solidFill>
+              </a:defRPr>
+            </a:pPr>
+            <a:endParaRPr lang="en-US" sz="1100" dirty="0">
+              <a:solidFill>
+                <a:srgbClr val="2E2E2C"/>
+              </a:solidFill>
+              <a:latin typeface="Courier" charset="0"/>
+              <a:ea typeface="Courier" charset="0"/>
+              <a:cs typeface="Courier" charset="0"/>
+              <a:sym typeface="Consolas"/>
+            </a:endParaRPr>
+          </a:p>
+        </p:txBody>
+      </p:sp>
+      <p:sp>
+        <p:nvSpPr>
+          <p:cNvPr id="5" name="Shape 1658"/>
+          <p:cNvSpPr txBox="1">
+            <a:spLocks/>
+          </p:cNvSpPr>
+          <p:nvPr/>
+        </p:nvSpPr>
+        <p:spPr>
+          <a:xfrm>
+            <a:off x="1288661" y="1812120"/>
+            <a:ext cx="6779014" cy="2420551"/>
+          </a:xfrm>
+          <a:prstGeom prst="rect">
+            <a:avLst/>
+          </a:prstGeom>
+        </p:spPr>
+        <p:txBody>
+          <a:bodyPr lIns="0" tIns="0" rIns="0" bIns="0">
+            <a:noAutofit/>
+          </a:bodyPr>
+          <a:lstStyle>
+            <a:lvl1pPr marL="228600" indent="-228600" algn="l" defTabSz="457200" rtl="0" eaLnBrk="1" latinLnBrk="0" hangingPunct="1">
+              <a:spcBef>
+                <a:spcPts val="0"/>
+              </a:spcBef>
+              <a:buClr>
+                <a:schemeClr val="accent1"/>
+              </a:buClr>
+              <a:buFont typeface="Wingdings" charset="2"/>
+              <a:buChar char="§"/>
+              <a:defRPr sz="2400" kern="1200">
+                <a:solidFill>
+                  <a:schemeClr val="tx1"/>
+                </a:solidFill>
+                <a:latin typeface="+mn-lt"/>
+                <a:ea typeface="+mn-ea"/>
+                <a:cs typeface="+mn-cs"/>
+              </a:defRPr>
+            </a:lvl1pPr>
+            <a:lvl2pPr marL="455613" indent="-227013" algn="l" defTabSz="457200" rtl="0" eaLnBrk="1" latinLnBrk="0" hangingPunct="1">
+              <a:spcBef>
+                <a:spcPts val="0"/>
+              </a:spcBef>
+              <a:buClr>
+                <a:srgbClr val="262626"/>
+              </a:buClr>
+              <a:buFont typeface="Wingdings" charset="2"/>
+              <a:buChar char="§"/>
+              <a:defRPr sz="2000" kern="1200">
+                <a:solidFill>
+                  <a:schemeClr val="tx1"/>
+                </a:solidFill>
+                <a:latin typeface="+mn-lt"/>
+                <a:ea typeface="+mn-ea"/>
+                <a:cs typeface="+mn-cs"/>
+              </a:defRPr>
+            </a:lvl2pPr>
+            <a:lvl3pPr marL="455613" indent="-228600" algn="l" defTabSz="457200" rtl="0" eaLnBrk="1" latinLnBrk="0" hangingPunct="1">
+              <a:spcBef>
+                <a:spcPts val="0"/>
+              </a:spcBef>
+              <a:buClr>
+                <a:srgbClr val="262626"/>
+              </a:buClr>
+              <a:buFont typeface="Wingdings" charset="2"/>
+              <a:buChar char="§"/>
+              <a:defRPr sz="2000" kern="1200">
+                <a:solidFill>
+                  <a:schemeClr val="tx1"/>
+                </a:solidFill>
+                <a:latin typeface="+mn-lt"/>
+                <a:ea typeface="+mn-ea"/>
+                <a:cs typeface="+mn-cs"/>
+              </a:defRPr>
+            </a:lvl3pPr>
+            <a:lvl4pPr marL="455613" indent="-228600" algn="l" defTabSz="457200" rtl="0" eaLnBrk="1" latinLnBrk="0" hangingPunct="1">
+              <a:spcBef>
+                <a:spcPts val="0"/>
+              </a:spcBef>
+              <a:buClr>
+                <a:srgbClr val="262626"/>
+              </a:buClr>
+              <a:buFont typeface="Wingdings" charset="2"/>
+              <a:buChar char="§"/>
+              <a:defRPr sz="2000" kern="1200">
+                <a:solidFill>
+                  <a:schemeClr val="tx1"/>
+                </a:solidFill>
+                <a:latin typeface="+mn-lt"/>
+                <a:ea typeface="+mn-ea"/>
+                <a:cs typeface="+mn-cs"/>
+              </a:defRPr>
+            </a:lvl4pPr>
+            <a:lvl5pPr marL="455613" indent="-228600" algn="l" defTabSz="457200" rtl="0" eaLnBrk="1" latinLnBrk="0" hangingPunct="1">
+              <a:spcBef>
+                <a:spcPts val="200"/>
+              </a:spcBef>
+              <a:buClr>
+                <a:srgbClr val="262626"/>
+              </a:buClr>
+              <a:buFont typeface="Wingdings" charset="2"/>
+              <a:buChar char="§"/>
+              <a:defRPr sz="2000" kern="1200">
+                <a:solidFill>
+                  <a:schemeClr val="tx1"/>
+                </a:solidFill>
+                <a:latin typeface="+mn-lt"/>
+                <a:ea typeface="+mn-ea"/>
+                <a:cs typeface="+mn-cs"/>
+              </a:defRPr>
+            </a:lvl5pPr>
+            <a:lvl6pPr marL="2514600" indent="-228600" algn="l" defTabSz="457200" rtl="0" eaLnBrk="1" latinLnBrk="0" hangingPunct="1">
+              <a:spcBef>
+                <a:spcPct val="20000"/>
+              </a:spcBef>
+              <a:buFont typeface="Arial"/>
+              <a:buChar char="•"/>
+              <a:defRPr sz="2000" kern="1200">
+                <a:solidFill>
+                  <a:schemeClr val="tx1"/>
+                </a:solidFill>
+                <a:latin typeface="+mn-lt"/>
+                <a:ea typeface="+mn-ea"/>
+                <a:cs typeface="+mn-cs"/>
+              </a:defRPr>
+            </a:lvl6pPr>
+            <a:lvl7pPr marL="2971800" indent="-228600" algn="l" defTabSz="457200" rtl="0" eaLnBrk="1" latinLnBrk="0" hangingPunct="1">
+              <a:spcBef>
+                <a:spcPct val="20000"/>
+              </a:spcBef>
+              <a:buFont typeface="Arial"/>
+              <a:buChar char="•"/>
+              <a:defRPr sz="2000" kern="1200">
+                <a:solidFill>
+                  <a:schemeClr val="tx1"/>
+                </a:solidFill>
+                <a:latin typeface="+mn-lt"/>
+                <a:ea typeface="+mn-ea"/>
+                <a:cs typeface="+mn-cs"/>
+              </a:defRPr>
+            </a:lvl7pPr>
+            <a:lvl8pPr marL="3429000" indent="-228600" algn="l" defTabSz="457200" rtl="0" eaLnBrk="1" latinLnBrk="0" hangingPunct="1">
+              <a:spcBef>
+                <a:spcPct val="20000"/>
+              </a:spcBef>
+              <a:buFont typeface="Arial"/>
+              <a:buChar char="•"/>
+              <a:defRPr sz="2000" kern="1200">
+                <a:solidFill>
+                  <a:schemeClr val="tx1"/>
+                </a:solidFill>
+                <a:latin typeface="+mn-lt"/>
+                <a:ea typeface="+mn-ea"/>
+                <a:cs typeface="+mn-cs"/>
+              </a:defRPr>
+            </a:lvl8pPr>
+            <a:lvl9pPr marL="3886200" indent="-228600" algn="l" defTabSz="457200" rtl="0" eaLnBrk="1" latinLnBrk="0" hangingPunct="1">
+              <a:spcBef>
+                <a:spcPct val="20000"/>
+              </a:spcBef>
+              <a:buFont typeface="Arial"/>
+              <a:buChar char="•"/>
+              <a:defRPr sz="2000" kern="1200">
+                <a:solidFill>
+                  <a:schemeClr val="tx1"/>
+                </a:solidFill>
+                <a:latin typeface="+mn-lt"/>
+                <a:ea typeface="+mn-ea"/>
+                <a:cs typeface="+mn-cs"/>
+              </a:defRPr>
+            </a:lvl9pPr>
+          </a:lstStyle>
+          <a:p>
+            <a:pPr marL="0" indent="0">
+              <a:buNone/>
+              <a:defRPr sz="1800">
+                <a:solidFill>
+                  <a:srgbClr val="000000"/>
+                </a:solidFill>
+              </a:defRPr>
+            </a:pPr>
+            <a:r>
+              <a:rPr lang="en-US" sz="1100" dirty="0">
+                <a:latin typeface="Courier" charset="0"/>
+                <a:ea typeface="Courier" charset="0"/>
+                <a:cs typeface="Courier" charset="0"/>
+                <a:sym typeface="Consolas"/>
+              </a:rPr>
+              <a:t>// connecting to a cluster</a:t>
+            </a:r>
+          </a:p>
+          <a:p>
+            <a:pPr marL="0" indent="0">
+              <a:buNone/>
+              <a:defRPr sz="1800">
+                <a:solidFill>
+                  <a:srgbClr val="000000"/>
+                </a:solidFill>
+              </a:defRPr>
+            </a:pPr>
+            <a:r>
+              <a:rPr lang="en-US" sz="1100" dirty="0">
+                <a:latin typeface="Courier" charset="0"/>
+                <a:ea typeface="Courier" charset="0"/>
+                <a:cs typeface="Courier" charset="0"/>
+                <a:sym typeface="Consolas"/>
+              </a:rPr>
+              <a:t>Cluster </a:t>
+            </a:r>
+            <a:r>
+              <a:rPr lang="en-US" sz="1100" dirty="0" err="1">
+                <a:latin typeface="Courier" charset="0"/>
+                <a:ea typeface="Courier" charset="0"/>
+                <a:cs typeface="Courier" charset="0"/>
+                <a:sym typeface="Consolas"/>
+              </a:rPr>
+              <a:t>cluster</a:t>
+            </a:r>
+            <a:r>
+              <a:rPr lang="en-US" sz="1100" dirty="0">
+                <a:latin typeface="Courier" charset="0"/>
+                <a:ea typeface="Courier" charset="0"/>
+                <a:cs typeface="Courier" charset="0"/>
+                <a:sym typeface="Consolas"/>
+              </a:rPr>
+              <a:t> = </a:t>
+            </a:r>
+            <a:r>
+              <a:rPr lang="en-US" sz="1100" dirty="0" err="1">
+                <a:latin typeface="Courier" charset="0"/>
+                <a:ea typeface="Courier" charset="0"/>
+                <a:cs typeface="Courier" charset="0"/>
+                <a:sym typeface="Consolas"/>
+              </a:rPr>
+              <a:t>CouchbaseCluster.create</a:t>
+            </a:r>
+            <a:r>
+              <a:rPr lang="en-US" sz="1100" dirty="0">
+                <a:latin typeface="Courier" charset="0"/>
+                <a:ea typeface="Courier" charset="0"/>
+                <a:cs typeface="Courier" charset="0"/>
+                <a:sym typeface="Consolas"/>
+              </a:rPr>
+              <a:t>("localhost");</a:t>
+            </a:r>
+          </a:p>
+          <a:p>
+            <a:pPr marL="0" indent="0">
+              <a:buNone/>
+              <a:defRPr sz="1800">
+                <a:solidFill>
+                  <a:srgbClr val="000000"/>
+                </a:solidFill>
+              </a:defRPr>
+            </a:pPr>
+            <a:endParaRPr lang="en-US" sz="1100" dirty="0">
+              <a:latin typeface="Courier" charset="0"/>
+              <a:ea typeface="Courier" charset="0"/>
+              <a:cs typeface="Courier" charset="0"/>
+              <a:sym typeface="Consolas"/>
+            </a:endParaRPr>
+          </a:p>
+          <a:p>
+            <a:pPr marL="0" indent="0">
+              <a:buNone/>
+              <a:defRPr sz="1800">
+                <a:solidFill>
+                  <a:srgbClr val="000000"/>
+                </a:solidFill>
+              </a:defRPr>
+            </a:pPr>
+            <a:r>
+              <a:rPr lang="en-US" sz="1100" dirty="0">
+                <a:latin typeface="Courier" charset="0"/>
+                <a:ea typeface="Courier" charset="0"/>
+                <a:cs typeface="Courier" charset="0"/>
+                <a:sym typeface="Consolas"/>
+              </a:rPr>
+              <a:t>// opening a bucket in the cluster</a:t>
+            </a:r>
+          </a:p>
+          <a:p>
+            <a:pPr marL="0" indent="0">
+              <a:buNone/>
+              <a:defRPr sz="1800">
+                <a:solidFill>
+                  <a:srgbClr val="000000"/>
+                </a:solidFill>
+              </a:defRPr>
+            </a:pPr>
+            <a:r>
+              <a:rPr lang="en-US" sz="1100" dirty="0">
+                <a:latin typeface="Courier" charset="0"/>
+                <a:ea typeface="Courier" charset="0"/>
+                <a:cs typeface="Courier" charset="0"/>
+                <a:sym typeface="Consolas"/>
+              </a:rPr>
+              <a:t>Bucket </a:t>
+            </a:r>
+            <a:r>
+              <a:rPr lang="en-US" sz="1100" dirty="0" err="1">
+                <a:latin typeface="Courier" charset="0"/>
+                <a:ea typeface="Courier" charset="0"/>
+                <a:cs typeface="Courier" charset="0"/>
+                <a:sym typeface="Consolas"/>
+              </a:rPr>
+              <a:t>bucket</a:t>
+            </a:r>
+            <a:r>
+              <a:rPr lang="en-US" sz="1100" dirty="0">
+                <a:latin typeface="Courier" charset="0"/>
+                <a:ea typeface="Courier" charset="0"/>
+                <a:cs typeface="Courier" charset="0"/>
+                <a:sym typeface="Consolas"/>
+              </a:rPr>
+              <a:t> = </a:t>
+            </a:r>
+            <a:r>
+              <a:rPr lang="en-US" sz="1100" dirty="0" err="1">
+                <a:latin typeface="Courier" charset="0"/>
+                <a:ea typeface="Courier" charset="0"/>
+                <a:cs typeface="Courier" charset="0"/>
+                <a:sym typeface="Consolas"/>
+              </a:rPr>
+              <a:t>cluster.openBucket</a:t>
+            </a:r>
+            <a:r>
+              <a:rPr lang="en-US" sz="1100" dirty="0">
+                <a:latin typeface="Courier" charset="0"/>
+                <a:ea typeface="Courier" charset="0"/>
+                <a:cs typeface="Courier" charset="0"/>
+                <a:sym typeface="Consolas"/>
+              </a:rPr>
+              <a:t>("default");</a:t>
+            </a:r>
+          </a:p>
+          <a:p>
+            <a:pPr marL="0" indent="0">
+              <a:buNone/>
+              <a:defRPr sz="1800">
+                <a:solidFill>
+                  <a:srgbClr val="000000"/>
+                </a:solidFill>
+              </a:defRPr>
+            </a:pPr>
+            <a:endParaRPr lang="en-US" sz="1100" dirty="0">
+              <a:latin typeface="Courier" charset="0"/>
+              <a:ea typeface="Courier" charset="0"/>
+              <a:cs typeface="Courier" charset="0"/>
+              <a:sym typeface="Consolas"/>
+            </a:endParaRPr>
+          </a:p>
+          <a:p>
+            <a:pPr marL="0" indent="0">
+              <a:buNone/>
+              <a:defRPr sz="1800">
+                <a:solidFill>
+                  <a:srgbClr val="000000"/>
+                </a:solidFill>
+              </a:defRPr>
+            </a:pPr>
+            <a:r>
+              <a:rPr lang="en-US" sz="1100" dirty="0">
+                <a:latin typeface="Courier" charset="0"/>
+                <a:ea typeface="Courier" charset="0"/>
+                <a:cs typeface="Courier" charset="0"/>
+                <a:sym typeface="Consolas"/>
+              </a:rPr>
+              <a:t>// preparing N1QL</a:t>
+            </a:r>
+          </a:p>
+          <a:p>
+            <a:pPr marL="0" indent="0">
+              <a:buNone/>
+              <a:defRPr sz="1800">
+                <a:solidFill>
+                  <a:srgbClr val="000000"/>
+                </a:solidFill>
+              </a:defRPr>
+            </a:pPr>
+            <a:r>
+              <a:rPr lang="en-US" sz="1100" dirty="0">
+                <a:latin typeface="Courier" charset="0"/>
+                <a:ea typeface="Courier" charset="0"/>
+                <a:cs typeface="Courier" charset="0"/>
+                <a:sym typeface="Consolas"/>
+              </a:rPr>
+              <a:t>N1qlQuery query =  N1qlQuery.parameterized(“SELECT * FROM `travel-sample`”);</a:t>
+            </a:r>
+          </a:p>
+          <a:p>
+            <a:pPr marL="0" indent="0">
+              <a:buNone/>
+              <a:defRPr sz="1800">
+                <a:solidFill>
+                  <a:srgbClr val="000000"/>
+                </a:solidFill>
+              </a:defRPr>
+            </a:pPr>
+            <a:endParaRPr lang="en-US" sz="1100" dirty="0">
+              <a:solidFill>
+                <a:srgbClr val="2E2E2C"/>
+              </a:solidFill>
+              <a:latin typeface="Courier" charset="0"/>
+              <a:ea typeface="Courier" charset="0"/>
+              <a:cs typeface="Courier" charset="0"/>
+              <a:sym typeface="Consolas"/>
+            </a:endParaRPr>
+          </a:p>
+          <a:p>
+            <a:pPr marL="0" indent="0">
+              <a:buNone/>
+              <a:defRPr sz="1800">
+                <a:solidFill>
+                  <a:srgbClr val="000000"/>
+                </a:solidFill>
+              </a:defRPr>
+            </a:pPr>
+            <a:r>
+              <a:rPr lang="en-US" sz="1100" dirty="0">
+                <a:solidFill>
+                  <a:srgbClr val="2E2E2C"/>
+                </a:solidFill>
+                <a:latin typeface="Courier" charset="0"/>
+                <a:ea typeface="Courier" charset="0"/>
+                <a:cs typeface="Courier" charset="0"/>
+                <a:sym typeface="Consolas"/>
+              </a:rPr>
+              <a:t>// creating and saving a document</a:t>
+            </a:r>
+          </a:p>
+          <a:p>
+            <a:pPr marL="0" indent="0">
+              <a:buNone/>
+              <a:defRPr sz="1800">
+                <a:solidFill>
+                  <a:srgbClr val="000000"/>
+                </a:solidFill>
+              </a:defRPr>
+            </a:pPr>
+            <a:r>
+              <a:rPr lang="en-US" sz="1100" dirty="0" err="1">
+                <a:solidFill>
+                  <a:srgbClr val="2E2E2C"/>
+                </a:solidFill>
+                <a:latin typeface="Courier" charset="0"/>
+                <a:ea typeface="Courier" charset="0"/>
+                <a:cs typeface="Courier" charset="0"/>
+                <a:sym typeface="Consolas"/>
+              </a:rPr>
+              <a:t>JsonObject</a:t>
+            </a:r>
+            <a:r>
+              <a:rPr lang="en-US" sz="1100" dirty="0">
+                <a:solidFill>
+                  <a:srgbClr val="2E2E2C"/>
+                </a:solidFill>
+                <a:latin typeface="Courier" charset="0"/>
+                <a:ea typeface="Courier" charset="0"/>
+                <a:cs typeface="Courier" charset="0"/>
+                <a:sym typeface="Consolas"/>
+              </a:rPr>
+              <a:t> person = </a:t>
+            </a:r>
+            <a:r>
+              <a:rPr lang="en-US" sz="1100" dirty="0" err="1">
+                <a:solidFill>
+                  <a:srgbClr val="2E2E2C"/>
+                </a:solidFill>
+                <a:latin typeface="Courier" charset="0"/>
+                <a:ea typeface="Courier" charset="0"/>
+                <a:cs typeface="Courier" charset="0"/>
+                <a:sym typeface="Consolas"/>
+              </a:rPr>
+              <a:t>JsonObject.create</a:t>
+            </a:r>
+            <a:r>
+              <a:rPr lang="en-US" sz="1100" dirty="0">
+                <a:solidFill>
+                  <a:srgbClr val="2E2E2C"/>
+                </a:solidFill>
+                <a:latin typeface="Courier" charset="0"/>
+                <a:ea typeface="Courier" charset="0"/>
+                <a:cs typeface="Courier" charset="0"/>
+                <a:sym typeface="Consolas"/>
+              </a:rPr>
+              <a:t>()</a:t>
+            </a:r>
+          </a:p>
+          <a:p>
+            <a:pPr marL="0" indent="0">
+              <a:buNone/>
+              <a:defRPr sz="1800">
+                <a:solidFill>
+                  <a:srgbClr val="000000"/>
+                </a:solidFill>
+              </a:defRPr>
+            </a:pPr>
+            <a:r>
+              <a:rPr lang="en-US" sz="1100" dirty="0">
+                <a:solidFill>
+                  <a:srgbClr val="2E2E2C"/>
+                </a:solidFill>
+                <a:latin typeface="Courier" charset="0"/>
+                <a:ea typeface="Courier" charset="0"/>
+                <a:cs typeface="Courier" charset="0"/>
+                <a:sym typeface="Consolas"/>
+              </a:rPr>
+              <a:t>                .put("</a:t>
+            </a:r>
+            <a:r>
+              <a:rPr lang="en-US" sz="1100" dirty="0" err="1">
+                <a:solidFill>
+                  <a:srgbClr val="2E2E2C"/>
+                </a:solidFill>
+                <a:latin typeface="Courier" charset="0"/>
+                <a:ea typeface="Courier" charset="0"/>
+                <a:cs typeface="Courier" charset="0"/>
+                <a:sym typeface="Consolas"/>
+              </a:rPr>
+              <a:t>firstName</a:t>
+            </a:r>
+            <a:r>
+              <a:rPr lang="en-US" sz="1100" dirty="0">
+                <a:solidFill>
+                  <a:srgbClr val="2E2E2C"/>
+                </a:solidFill>
+                <a:latin typeface="Courier" charset="0"/>
+                <a:ea typeface="Courier" charset="0"/>
+                <a:cs typeface="Courier" charset="0"/>
+                <a:sym typeface="Consolas"/>
+              </a:rPr>
+              <a:t>", "John")</a:t>
+            </a:r>
+          </a:p>
+          <a:p>
+            <a:pPr marL="0" indent="0">
+              <a:buNone/>
+              <a:defRPr sz="1800">
+                <a:solidFill>
+                  <a:srgbClr val="000000"/>
+                </a:solidFill>
+              </a:defRPr>
+            </a:pPr>
+            <a:r>
+              <a:rPr lang="en-US" sz="1100" dirty="0">
+                <a:solidFill>
+                  <a:srgbClr val="2E2E2C"/>
+                </a:solidFill>
+                <a:latin typeface="Courier" charset="0"/>
+                <a:ea typeface="Courier" charset="0"/>
+                <a:cs typeface="Courier" charset="0"/>
+                <a:sym typeface="Consolas"/>
+              </a:rPr>
+              <a:t>                .put("</a:t>
+            </a:r>
+            <a:r>
+              <a:rPr lang="en-US" sz="1100" dirty="0" err="1">
+                <a:solidFill>
+                  <a:srgbClr val="2E2E2C"/>
+                </a:solidFill>
+                <a:latin typeface="Courier" charset="0"/>
+                <a:ea typeface="Courier" charset="0"/>
+                <a:cs typeface="Courier" charset="0"/>
+                <a:sym typeface="Consolas"/>
+              </a:rPr>
+              <a:t>lastName</a:t>
+            </a:r>
+            <a:r>
+              <a:rPr lang="en-US" sz="1100" dirty="0">
+                <a:solidFill>
+                  <a:srgbClr val="2E2E2C"/>
+                </a:solidFill>
+                <a:latin typeface="Courier" charset="0"/>
+                <a:ea typeface="Courier" charset="0"/>
+                <a:cs typeface="Courier" charset="0"/>
+                <a:sym typeface="Consolas"/>
+              </a:rPr>
+              <a:t>", "Doe");</a:t>
+            </a:r>
+          </a:p>
+          <a:p>
+            <a:pPr marL="0" indent="0">
+              <a:buNone/>
+              <a:defRPr sz="1800">
+                <a:solidFill>
+                  <a:srgbClr val="000000"/>
+                </a:solidFill>
+              </a:defRPr>
+            </a:pPr>
+            <a:r>
+              <a:rPr lang="en-US" sz="1100" dirty="0" err="1">
+                <a:solidFill>
+                  <a:srgbClr val="2E2E2C"/>
+                </a:solidFill>
+                <a:latin typeface="Courier" charset="0"/>
+                <a:ea typeface="Courier" charset="0"/>
+                <a:cs typeface="Courier" charset="0"/>
+                <a:sym typeface="Consolas"/>
+              </a:rPr>
+              <a:t>bucket.upsert</a:t>
+            </a:r>
+            <a:r>
+              <a:rPr lang="en-US" sz="1100" dirty="0">
+                <a:solidFill>
+                  <a:srgbClr val="2E2E2C"/>
+                </a:solidFill>
+                <a:latin typeface="Courier" charset="0"/>
+                <a:ea typeface="Courier" charset="0"/>
+                <a:cs typeface="Courier" charset="0"/>
+                <a:sym typeface="Consolas"/>
+              </a:rPr>
+              <a:t>(</a:t>
+            </a:r>
+            <a:r>
+              <a:rPr lang="en-US" sz="1100" dirty="0" err="1">
+                <a:solidFill>
+                  <a:srgbClr val="2E2E2C"/>
+                </a:solidFill>
+                <a:latin typeface="Courier" charset="0"/>
+                <a:ea typeface="Courier" charset="0"/>
+                <a:cs typeface="Courier" charset="0"/>
+                <a:sym typeface="Consolas"/>
+              </a:rPr>
+              <a:t>JsonDocument.create</a:t>
+            </a:r>
+            <a:r>
+              <a:rPr lang="en-US" sz="1100" dirty="0">
+                <a:solidFill>
+                  <a:srgbClr val="2E2E2C"/>
+                </a:solidFill>
+                <a:latin typeface="Courier" charset="0"/>
+                <a:ea typeface="Courier" charset="0"/>
+                <a:cs typeface="Courier" charset="0"/>
+                <a:sym typeface="Consolas"/>
+              </a:rPr>
+              <a:t>(key, person));</a:t>
+            </a:r>
           </a:p>
         </p:txBody>
       </p:sp>

</xml_diff>